<commit_message>
mo or il style
</commit_message>
<xml_diff>
--- a/TriviaNight.pptx
+++ b/TriviaNight.pptx
@@ -3604,7 +3604,7 @@
             <a:pPr algn="l"/>
             <a:r>
               <a:rPr lang="en-US" sz="4400"/>
-              <a:t>Question 9 of 10 in round 01</a:t>
+              <a:t>Question 1 of 10 in round 09</a:t>
             </a:r>
             <a:endParaRPr lang="en-US" sz="1100"/>
           </a:p>
@@ -3685,7 +3685,7 @@
             <a:pPr algn="l"/>
             <a:r>
               <a:rPr lang="en-US" sz="4400"/>
-              <a:t>Question 3 of 10 in round 04</a:t>
+              <a:t>Question 4 of 10 in round 03</a:t>
             </a:r>
             <a:endParaRPr lang="en-US" sz="1100"/>
           </a:p>
@@ -3847,7 +3847,7 @@
             <a:pPr algn="l"/>
             <a:r>
               <a:rPr lang="en-US" sz="4400"/>
-              <a:t>Question 5 of 10 in round 04</a:t>
+              <a:t>Question 4 of 10 in round 05</a:t>
             </a:r>
             <a:endParaRPr lang="en-US" sz="1100"/>
           </a:p>
@@ -3928,7 +3928,7 @@
             <a:pPr algn="l"/>
             <a:r>
               <a:rPr lang="en-US" sz="4400"/>
-              <a:t>Question 6 of 10 in round 04</a:t>
+              <a:t>Question 4 of 10 in round 06</a:t>
             </a:r>
             <a:endParaRPr lang="en-US" sz="1100"/>
           </a:p>
@@ -4009,7 +4009,7 @@
             <a:pPr algn="l"/>
             <a:r>
               <a:rPr lang="en-US" sz="4400"/>
-              <a:t>Question 7 of 10 in round 04</a:t>
+              <a:t>Question 4 of 10 in round 07</a:t>
             </a:r>
             <a:endParaRPr lang="en-US" sz="1100"/>
           </a:p>
@@ -4090,7 +4090,7 @@
             <a:pPr algn="l"/>
             <a:r>
               <a:rPr lang="en-US" sz="4400"/>
-              <a:t>Question 8 of 10 in round 04</a:t>
+              <a:t>Question 4 of 10 in round 08</a:t>
             </a:r>
             <a:endParaRPr lang="en-US" sz="1100"/>
           </a:p>
@@ -4171,7 +4171,7 @@
             <a:pPr algn="l"/>
             <a:r>
               <a:rPr lang="en-US" sz="4400"/>
-              <a:t>Question 9 of 10 in round 04</a:t>
+              <a:t>Question 4 of 10 in round 09</a:t>
             </a:r>
             <a:endParaRPr lang="en-US" sz="1100"/>
           </a:p>
@@ -4252,7 +4252,7 @@
             <a:pPr algn="l"/>
             <a:r>
               <a:rPr lang="en-US" sz="4400"/>
-              <a:t>Question 10 of 10 in round 04</a:t>
+              <a:t>Question 4 of 10 in round 10</a:t>
             </a:r>
             <a:endParaRPr lang="en-US" sz="1100"/>
           </a:p>
@@ -4509,7 +4509,7 @@
             <a:pPr algn="l"/>
             <a:r>
               <a:rPr lang="en-US" sz="4400"/>
-              <a:t>Question 1 of 10 in round 04</a:t>
+              <a:t>Question 4 of 10 in round 01</a:t>
             </a:r>
             <a:endParaRPr lang="en-US" sz="1100"/>
           </a:p>
@@ -4590,7 +4590,7 @@
             <a:pPr algn="l"/>
             <a:r>
               <a:rPr lang="en-US" sz="4400"/>
-              <a:t>Question 10 of 10 in round 01</a:t>
+              <a:t>Question 1 of 10 in round 10</a:t>
             </a:r>
             <a:endParaRPr lang="en-US" sz="1100"/>
           </a:p>
@@ -4671,7 +4671,7 @@
             <a:pPr algn="l"/>
             <a:r>
               <a:rPr lang="en-US" sz="4400"/>
-              <a:t>Question 1 of 10 in round 04</a:t>
+              <a:t>Question 4 of 10 in round 01</a:t>
             </a:r>
             <a:endParaRPr lang="en-US" sz="1100"/>
           </a:p>
@@ -4699,7 +4699,7 @@
             <a:pPr algn="l"/>
             <a:r>
               <a:rPr lang="en-US" sz="3600"/>
-              <a:t>Answer 1 of 10 in round 04</a:t>
+              <a:t>Answer 4 of 10 in round 01</a:t>
             </a:r>
             <a:endParaRPr lang="en-US" sz="1100"/>
           </a:p>
@@ -4780,7 +4780,7 @@
             <a:pPr algn="l"/>
             <a:r>
               <a:rPr lang="en-US" sz="4400"/>
-              <a:t>Question 2 of 10 in round 04</a:t>
+              <a:t>Question 4 of 10 in round 02</a:t>
             </a:r>
             <a:endParaRPr lang="en-US" sz="1100"/>
           </a:p>
@@ -4861,7 +4861,7 @@
             <a:pPr algn="l"/>
             <a:r>
               <a:rPr lang="en-US" sz="4400"/>
-              <a:t>Question 2 of 10 in round 04</a:t>
+              <a:t>Question 4 of 10 in round 02</a:t>
             </a:r>
             <a:endParaRPr lang="en-US" sz="1100"/>
           </a:p>
@@ -4889,7 +4889,7 @@
             <a:pPr algn="l"/>
             <a:r>
               <a:rPr lang="en-US" sz="3600"/>
-              <a:t>Answer 2 of 10 in round 04</a:t>
+              <a:t>Answer 4 of 10 in round 02</a:t>
             </a:r>
             <a:endParaRPr lang="en-US" sz="1100"/>
           </a:p>
@@ -4970,7 +4970,7 @@
             <a:pPr algn="l"/>
             <a:r>
               <a:rPr lang="en-US" sz="4400"/>
-              <a:t>Question 3 of 10 in round 04</a:t>
+              <a:t>Question 4 of 10 in round 03</a:t>
             </a:r>
             <a:endParaRPr lang="en-US" sz="1100"/>
           </a:p>
@@ -5051,7 +5051,7 @@
             <a:pPr algn="l"/>
             <a:r>
               <a:rPr lang="en-US" sz="4400"/>
-              <a:t>Question 3 of 10 in round 04</a:t>
+              <a:t>Question 4 of 10 in round 03</a:t>
             </a:r>
             <a:endParaRPr lang="en-US" sz="1100"/>
           </a:p>
@@ -5079,7 +5079,7 @@
             <a:pPr algn="l"/>
             <a:r>
               <a:rPr lang="en-US" sz="3600"/>
-              <a:t>Answer 3 of 10 in round 04</a:t>
+              <a:t>Answer 4 of 10 in round 03</a:t>
             </a:r>
             <a:endParaRPr lang="en-US" sz="1100"/>
           </a:p>
@@ -5350,7 +5350,7 @@
             <a:pPr algn="l"/>
             <a:r>
               <a:rPr lang="en-US" sz="4400"/>
-              <a:t>Question 5 of 10 in round 04</a:t>
+              <a:t>Question 4 of 10 in round 05</a:t>
             </a:r>
             <a:endParaRPr lang="en-US" sz="1100"/>
           </a:p>
@@ -5431,7 +5431,7 @@
             <a:pPr algn="l"/>
             <a:r>
               <a:rPr lang="en-US" sz="4400"/>
-              <a:t>Question 5 of 10 in round 04</a:t>
+              <a:t>Question 4 of 10 in round 05</a:t>
             </a:r>
             <a:endParaRPr lang="en-US" sz="1100"/>
           </a:p>
@@ -5459,7 +5459,7 @@
             <a:pPr algn="l"/>
             <a:r>
               <a:rPr lang="en-US" sz="3600"/>
-              <a:t>Answer 5 of 10 in round 04</a:t>
+              <a:t>Answer 4 of 10 in round 05</a:t>
             </a:r>
             <a:endParaRPr lang="en-US" sz="1100"/>
           </a:p>
@@ -5540,7 +5540,7 @@
             <a:pPr algn="l"/>
             <a:r>
               <a:rPr lang="en-US" sz="4400"/>
-              <a:t>Question 6 of 10 in round 04</a:t>
+              <a:t>Question 4 of 10 in round 06</a:t>
             </a:r>
             <a:endParaRPr lang="en-US" sz="1100"/>
           </a:p>
@@ -5797,7 +5797,7 @@
             <a:pPr algn="l"/>
             <a:r>
               <a:rPr lang="en-US" sz="4400"/>
-              <a:t>Question 6 of 10 in round 04</a:t>
+              <a:t>Question 4 of 10 in round 06</a:t>
             </a:r>
             <a:endParaRPr lang="en-US" sz="1100"/>
           </a:p>
@@ -5825,7 +5825,7 @@
             <a:pPr algn="l"/>
             <a:r>
               <a:rPr lang="en-US" sz="3600"/>
-              <a:t>Answer 6 of 10 in round 04</a:t>
+              <a:t>Answer 4 of 10 in round 06</a:t>
             </a:r>
             <a:endParaRPr lang="en-US" sz="1100"/>
           </a:p>
@@ -5906,7 +5906,7 @@
             <a:pPr algn="l"/>
             <a:r>
               <a:rPr lang="en-US" sz="4400"/>
-              <a:t>Question 7 of 10 in round 04</a:t>
+              <a:t>Question 4 of 10 in round 07</a:t>
             </a:r>
             <a:endParaRPr lang="en-US" sz="1100"/>
           </a:p>
@@ -5987,7 +5987,7 @@
             <a:pPr algn="l"/>
             <a:r>
               <a:rPr lang="en-US" sz="4400"/>
-              <a:t>Question 7 of 10 in round 04</a:t>
+              <a:t>Question 4 of 10 in round 07</a:t>
             </a:r>
             <a:endParaRPr lang="en-US" sz="1100"/>
           </a:p>
@@ -6015,7 +6015,7 @@
             <a:pPr algn="l"/>
             <a:r>
               <a:rPr lang="en-US" sz="3600"/>
-              <a:t>Answer 7 of 10 in round 04</a:t>
+              <a:t>Answer 4 of 10 in round 07</a:t>
             </a:r>
             <a:endParaRPr lang="en-US" sz="1100"/>
           </a:p>
@@ -6096,7 +6096,7 @@
             <a:pPr algn="l"/>
             <a:r>
               <a:rPr lang="en-US" sz="4400"/>
-              <a:t>Question 8 of 10 in round 04</a:t>
+              <a:t>Question 4 of 10 in round 08</a:t>
             </a:r>
             <a:endParaRPr lang="en-US" sz="1100"/>
           </a:p>
@@ -6177,7 +6177,7 @@
             <a:pPr algn="l"/>
             <a:r>
               <a:rPr lang="en-US" sz="4400"/>
-              <a:t>Question 8 of 10 in round 04</a:t>
+              <a:t>Question 4 of 10 in round 08</a:t>
             </a:r>
             <a:endParaRPr lang="en-US" sz="1100"/>
           </a:p>
@@ -6205,7 +6205,7 @@
             <a:pPr algn="l"/>
             <a:r>
               <a:rPr lang="en-US" sz="3600"/>
-              <a:t>Answer 8 of 10 in round 04</a:t>
+              <a:t>Answer 4 of 10 in round 08</a:t>
             </a:r>
             <a:endParaRPr lang="en-US" sz="1100"/>
           </a:p>
@@ -6286,7 +6286,7 @@
             <a:pPr algn="l"/>
             <a:r>
               <a:rPr lang="en-US" sz="4400"/>
-              <a:t>Question 9 of 10 in round 04</a:t>
+              <a:t>Question 4 of 10 in round 09</a:t>
             </a:r>
             <a:endParaRPr lang="en-US" sz="1100"/>
           </a:p>
@@ -6367,7 +6367,7 @@
             <a:pPr algn="l"/>
             <a:r>
               <a:rPr lang="en-US" sz="4400"/>
-              <a:t>Question 9 of 10 in round 04</a:t>
+              <a:t>Question 4 of 10 in round 09</a:t>
             </a:r>
             <a:endParaRPr lang="en-US" sz="1100"/>
           </a:p>
@@ -6395,7 +6395,7 @@
             <a:pPr algn="l"/>
             <a:r>
               <a:rPr lang="en-US" sz="3600"/>
-              <a:t>Answer 9 of 10 in round 04</a:t>
+              <a:t>Answer 4 of 10 in round 09</a:t>
             </a:r>
             <a:endParaRPr lang="en-US" sz="1100"/>
           </a:p>
@@ -6476,7 +6476,7 @@
             <a:pPr algn="l"/>
             <a:r>
               <a:rPr lang="en-US" sz="4400"/>
-              <a:t>Question 10 of 10 in round 04</a:t>
+              <a:t>Question 4 of 10 in round 10</a:t>
             </a:r>
             <a:endParaRPr lang="en-US" sz="1100"/>
           </a:p>
@@ -6557,7 +6557,7 @@
             <a:pPr algn="l"/>
             <a:r>
               <a:rPr lang="en-US" sz="4400"/>
-              <a:t>Question 10 of 10 in round 04</a:t>
+              <a:t>Question 4 of 10 in round 10</a:t>
             </a:r>
             <a:endParaRPr lang="en-US" sz="1100"/>
           </a:p>
@@ -6585,7 +6585,7 @@
             <a:pPr algn="l"/>
             <a:r>
               <a:rPr lang="en-US" sz="3600"/>
-              <a:t>Answer 10 of 10 in round 04</a:t>
+              <a:t>Answer 4 of 10 in round 10</a:t>
             </a:r>
             <a:endParaRPr lang="en-US" sz="1100"/>
           </a:p>
@@ -6923,7 +6923,7 @@
             <a:pPr algn="l"/>
             <a:r>
               <a:rPr lang="en-US" sz="4400"/>
-              <a:t>Question 1 of 10 in round 05</a:t>
+              <a:t>Question 5 of 10 in round 01</a:t>
             </a:r>
             <a:endParaRPr lang="en-US" sz="1100"/>
           </a:p>
@@ -7004,7 +7004,7 @@
             <a:pPr algn="l"/>
             <a:r>
               <a:rPr lang="en-US" sz="4400"/>
-              <a:t>Question 2 of 10 in round 05</a:t>
+              <a:t>Question 5 of 10 in round 02</a:t>
             </a:r>
             <a:endParaRPr lang="en-US" sz="1100"/>
           </a:p>
@@ -7085,7 +7085,7 @@
             <a:pPr algn="l"/>
             <a:r>
               <a:rPr lang="en-US" sz="4400"/>
-              <a:t>Question 3 of 10 in round 05</a:t>
+              <a:t>Question 5 of 10 in round 03</a:t>
             </a:r>
             <a:endParaRPr lang="en-US" sz="1100"/>
           </a:p>
@@ -7166,7 +7166,7 @@
             <a:pPr algn="l"/>
             <a:r>
               <a:rPr lang="en-US" sz="4400"/>
-              <a:t>Question 4 of 10 in round 05</a:t>
+              <a:t>Question 5 of 10 in round 04</a:t>
             </a:r>
             <a:endParaRPr lang="en-US" sz="1100"/>
           </a:p>
@@ -7328,7 +7328,7 @@
             <a:pPr algn="l"/>
             <a:r>
               <a:rPr lang="en-US" sz="4400"/>
-              <a:t>Question 6 of 10 in round 05</a:t>
+              <a:t>Question 5 of 10 in round 06</a:t>
             </a:r>
             <a:endParaRPr lang="en-US" sz="1100"/>
           </a:p>
@@ -7409,7 +7409,7 @@
             <a:pPr algn="l"/>
             <a:r>
               <a:rPr lang="en-US" sz="4400"/>
-              <a:t>Question 7 of 10 in round 05</a:t>
+              <a:t>Question 5 of 10 in round 07</a:t>
             </a:r>
             <a:endParaRPr lang="en-US" sz="1100"/>
           </a:p>
@@ -7490,7 +7490,7 @@
             <a:pPr algn="l"/>
             <a:r>
               <a:rPr lang="en-US" sz="4400"/>
-              <a:t>Question 8 of 10 in round 05</a:t>
+              <a:t>Question 5 of 10 in round 08</a:t>
             </a:r>
             <a:endParaRPr lang="en-US" sz="1100"/>
           </a:p>
@@ -7571,7 +7571,7 @@
             <a:pPr algn="l"/>
             <a:r>
               <a:rPr lang="en-US" sz="4400"/>
-              <a:t>Question 9 of 10 in round 05</a:t>
+              <a:t>Question 5 of 10 in round 09</a:t>
             </a:r>
             <a:endParaRPr lang="en-US" sz="1100"/>
           </a:p>
@@ -7652,7 +7652,7 @@
             <a:pPr algn="l"/>
             <a:r>
               <a:rPr lang="en-US" sz="4400"/>
-              <a:t>Question 10 of 10 in round 05</a:t>
+              <a:t>Question 5 of 10 in round 10</a:t>
             </a:r>
             <a:endParaRPr lang="en-US" sz="1100"/>
           </a:p>
@@ -8018,7 +8018,7 @@
             <a:pPr algn="l"/>
             <a:r>
               <a:rPr lang="en-US" sz="4400"/>
-              <a:t>Question 1 of 10 in round 05</a:t>
+              <a:t>Question 5 of 10 in round 01</a:t>
             </a:r>
             <a:endParaRPr lang="en-US" sz="1100"/>
           </a:p>
@@ -8099,7 +8099,7 @@
             <a:pPr algn="l"/>
             <a:r>
               <a:rPr lang="en-US" sz="4400"/>
-              <a:t>Question 1 of 10 in round 05</a:t>
+              <a:t>Question 5 of 10 in round 01</a:t>
             </a:r>
             <a:endParaRPr lang="en-US" sz="1100"/>
           </a:p>
@@ -8127,7 +8127,7 @@
             <a:pPr algn="l"/>
             <a:r>
               <a:rPr lang="en-US" sz="3600"/>
-              <a:t>Answer 1 of 10 in round 05</a:t>
+              <a:t>Answer 5 of 10 in round 01</a:t>
             </a:r>
             <a:endParaRPr lang="en-US" sz="1100"/>
           </a:p>
@@ -8208,7 +8208,7 @@
             <a:pPr algn="l"/>
             <a:r>
               <a:rPr lang="en-US" sz="4400"/>
-              <a:t>Question 2 of 10 in round 05</a:t>
+              <a:t>Question 5 of 10 in round 02</a:t>
             </a:r>
             <a:endParaRPr lang="en-US" sz="1100"/>
           </a:p>
@@ -8289,7 +8289,7 @@
             <a:pPr algn="l"/>
             <a:r>
               <a:rPr lang="en-US" sz="4400"/>
-              <a:t>Question 2 of 10 in round 05</a:t>
+              <a:t>Question 5 of 10 in round 02</a:t>
             </a:r>
             <a:endParaRPr lang="en-US" sz="1100"/>
           </a:p>
@@ -8317,7 +8317,7 @@
             <a:pPr algn="l"/>
             <a:r>
               <a:rPr lang="en-US" sz="3600"/>
-              <a:t>Answer 2 of 10 in round 05</a:t>
+              <a:t>Answer 5 of 10 in round 02</a:t>
             </a:r>
             <a:endParaRPr lang="en-US" sz="1100"/>
           </a:p>
@@ -8398,7 +8398,7 @@
             <a:pPr algn="l"/>
             <a:r>
               <a:rPr lang="en-US" sz="4400"/>
-              <a:t>Question 3 of 10 in round 05</a:t>
+              <a:t>Question 5 of 10 in round 03</a:t>
             </a:r>
             <a:endParaRPr lang="en-US" sz="1100"/>
           </a:p>
@@ -8479,7 +8479,7 @@
             <a:pPr algn="l"/>
             <a:r>
               <a:rPr lang="en-US" sz="4400"/>
-              <a:t>Question 3 of 10 in round 05</a:t>
+              <a:t>Question 5 of 10 in round 03</a:t>
             </a:r>
             <a:endParaRPr lang="en-US" sz="1100"/>
           </a:p>
@@ -8507,7 +8507,7 @@
             <a:pPr algn="l"/>
             <a:r>
               <a:rPr lang="en-US" sz="3600"/>
-              <a:t>Answer 3 of 10 in round 05</a:t>
+              <a:t>Answer 5 of 10 in round 03</a:t>
             </a:r>
             <a:endParaRPr lang="en-US" sz="1100"/>
           </a:p>
@@ -8588,7 +8588,7 @@
             <a:pPr algn="l"/>
             <a:r>
               <a:rPr lang="en-US" sz="4400"/>
-              <a:t>Question 4 of 10 in round 05</a:t>
+              <a:t>Question 5 of 10 in round 04</a:t>
             </a:r>
             <a:endParaRPr lang="en-US" sz="1100"/>
           </a:p>
@@ -8669,7 +8669,7 @@
             <a:pPr algn="l"/>
             <a:r>
               <a:rPr lang="en-US" sz="4400"/>
-              <a:t>Question 4 of 10 in round 05</a:t>
+              <a:t>Question 5 of 10 in round 04</a:t>
             </a:r>
             <a:endParaRPr lang="en-US" sz="1100"/>
           </a:p>
@@ -8697,7 +8697,7 @@
             <a:pPr algn="l"/>
             <a:r>
               <a:rPr lang="en-US" sz="3600"/>
-              <a:t>Answer 4 of 10 in round 05</a:t>
+              <a:t>Answer 5 of 10 in round 04</a:t>
             </a:r>
             <a:endParaRPr lang="en-US" sz="1100"/>
           </a:p>
@@ -8859,7 +8859,7 @@
             <a:pPr algn="l"/>
             <a:r>
               <a:rPr lang="en-US" sz="4400"/>
-              <a:t>Question 2 of 10 in round 01</a:t>
+              <a:t>Question 1 of 10 in round 02</a:t>
             </a:r>
             <a:endParaRPr lang="en-US" sz="1100"/>
           </a:p>
@@ -9049,7 +9049,7 @@
             <a:pPr algn="l"/>
             <a:r>
               <a:rPr lang="en-US" sz="4400"/>
-              <a:t>Question 6 of 10 in round 05</a:t>
+              <a:t>Question 5 of 10 in round 06</a:t>
             </a:r>
             <a:endParaRPr lang="en-US" sz="1100"/>
           </a:p>
@@ -9130,7 +9130,7 @@
             <a:pPr algn="l"/>
             <a:r>
               <a:rPr lang="en-US" sz="4400"/>
-              <a:t>Question 6 of 10 in round 05</a:t>
+              <a:t>Question 5 of 10 in round 06</a:t>
             </a:r>
             <a:endParaRPr lang="en-US" sz="1100"/>
           </a:p>
@@ -9158,7 +9158,7 @@
             <a:pPr algn="l"/>
             <a:r>
               <a:rPr lang="en-US" sz="3600"/>
-              <a:t>Answer 6 of 10 in round 05</a:t>
+              <a:t>Answer 5 of 10 in round 06</a:t>
             </a:r>
             <a:endParaRPr lang="en-US" sz="1100"/>
           </a:p>
@@ -9239,7 +9239,7 @@
             <a:pPr algn="l"/>
             <a:r>
               <a:rPr lang="en-US" sz="4400"/>
-              <a:t>Question 7 of 10 in round 05</a:t>
+              <a:t>Question 5 of 10 in round 07</a:t>
             </a:r>
             <a:endParaRPr lang="en-US" sz="1100"/>
           </a:p>
@@ -9320,7 +9320,7 @@
             <a:pPr algn="l"/>
             <a:r>
               <a:rPr lang="en-US" sz="4400"/>
-              <a:t>Question 7 of 10 in round 05</a:t>
+              <a:t>Question 5 of 10 in round 07</a:t>
             </a:r>
             <a:endParaRPr lang="en-US" sz="1100"/>
           </a:p>
@@ -9348,7 +9348,7 @@
             <a:pPr algn="l"/>
             <a:r>
               <a:rPr lang="en-US" sz="3600"/>
-              <a:t>Answer 7 of 10 in round 05</a:t>
+              <a:t>Answer 5 of 10 in round 07</a:t>
             </a:r>
             <a:endParaRPr lang="en-US" sz="1100"/>
           </a:p>
@@ -9429,7 +9429,7 @@
             <a:pPr algn="l"/>
             <a:r>
               <a:rPr lang="en-US" sz="4400"/>
-              <a:t>Question 8 of 10 in round 05</a:t>
+              <a:t>Question 5 of 10 in round 08</a:t>
             </a:r>
             <a:endParaRPr lang="en-US" sz="1100"/>
           </a:p>
@@ -9510,7 +9510,7 @@
             <a:pPr algn="l"/>
             <a:r>
               <a:rPr lang="en-US" sz="4400"/>
-              <a:t>Question 8 of 10 in round 05</a:t>
+              <a:t>Question 5 of 10 in round 08</a:t>
             </a:r>
             <a:endParaRPr lang="en-US" sz="1100"/>
           </a:p>
@@ -9538,7 +9538,7 @@
             <a:pPr algn="l"/>
             <a:r>
               <a:rPr lang="en-US" sz="3600"/>
-              <a:t>Answer 8 of 10 in round 05</a:t>
+              <a:t>Answer 5 of 10 in round 08</a:t>
             </a:r>
             <a:endParaRPr lang="en-US" sz="1100"/>
           </a:p>
@@ -9619,7 +9619,7 @@
             <a:pPr algn="l"/>
             <a:r>
               <a:rPr lang="en-US" sz="4400"/>
-              <a:t>Question 9 of 10 in round 05</a:t>
+              <a:t>Question 5 of 10 in round 09</a:t>
             </a:r>
             <a:endParaRPr lang="en-US" sz="1100"/>
           </a:p>
@@ -9700,7 +9700,7 @@
             <a:pPr algn="l"/>
             <a:r>
               <a:rPr lang="en-US" sz="4400"/>
-              <a:t>Question 9 of 10 in round 05</a:t>
+              <a:t>Question 5 of 10 in round 09</a:t>
             </a:r>
             <a:endParaRPr lang="en-US" sz="1100"/>
           </a:p>
@@ -9728,7 +9728,7 @@
             <a:pPr algn="l"/>
             <a:r>
               <a:rPr lang="en-US" sz="3600"/>
-              <a:t>Answer 9 of 10 in round 05</a:t>
+              <a:t>Answer 5 of 10 in round 09</a:t>
             </a:r>
             <a:endParaRPr lang="en-US" sz="1100"/>
           </a:p>
@@ -9809,7 +9809,7 @@
             <a:pPr algn="l"/>
             <a:r>
               <a:rPr lang="en-US" sz="4400"/>
-              <a:t>Question 10 of 10 in round 05</a:t>
+              <a:t>Question 5 of 10 in round 10</a:t>
             </a:r>
             <a:endParaRPr lang="en-US" sz="1100"/>
           </a:p>
@@ -9890,7 +9890,7 @@
             <a:pPr algn="l"/>
             <a:r>
               <a:rPr lang="en-US" sz="4400"/>
-              <a:t>Question 2 of 10 in round 01</a:t>
+              <a:t>Question 1 of 10 in round 02</a:t>
             </a:r>
             <a:endParaRPr lang="en-US" sz="1100"/>
           </a:p>
@@ -9918,7 +9918,7 @@
             <a:pPr algn="l"/>
             <a:r>
               <a:rPr lang="en-US" sz="3600"/>
-              <a:t>Answer 2 of 10 in round 01</a:t>
+              <a:t>Answer 1 of 10 in round 02</a:t>
             </a:r>
             <a:endParaRPr lang="en-US" sz="1100"/>
           </a:p>
@@ -9999,7 +9999,7 @@
             <a:pPr algn="l"/>
             <a:r>
               <a:rPr lang="en-US" sz="4400"/>
-              <a:t>Question 10 of 10 in round 05</a:t>
+              <a:t>Question 5 of 10 in round 10</a:t>
             </a:r>
             <a:endParaRPr lang="en-US" sz="1100"/>
           </a:p>
@@ -10027,7 +10027,7 @@
             <a:pPr algn="l"/>
             <a:r>
               <a:rPr lang="en-US" sz="3600"/>
-              <a:t>Answer 10 of 10 in round 05</a:t>
+              <a:t>Answer 5 of 10 in round 10</a:t>
             </a:r>
             <a:endParaRPr lang="en-US" sz="1100"/>
           </a:p>
@@ -10284,7 +10284,7 @@
             <a:pPr algn="l"/>
             <a:r>
               <a:rPr lang="en-US" sz="4400"/>
-              <a:t>Question 1 of 10 in round 06</a:t>
+              <a:t>Question 6 of 10 in round 01</a:t>
             </a:r>
             <a:endParaRPr lang="en-US" sz="1100"/>
           </a:p>
@@ -10365,7 +10365,7 @@
             <a:pPr algn="l"/>
             <a:r>
               <a:rPr lang="en-US" sz="4400"/>
-              <a:t>Question 2 of 10 in round 06</a:t>
+              <a:t>Question 6 of 10 in round 02</a:t>
             </a:r>
             <a:endParaRPr lang="en-US" sz="1100"/>
           </a:p>
@@ -10446,7 +10446,7 @@
             <a:pPr algn="l"/>
             <a:r>
               <a:rPr lang="en-US" sz="4400"/>
-              <a:t>Question 3 of 10 in round 06</a:t>
+              <a:t>Question 6 of 10 in round 03</a:t>
             </a:r>
             <a:endParaRPr lang="en-US" sz="1100"/>
           </a:p>
@@ -10527,7 +10527,7 @@
             <a:pPr algn="l"/>
             <a:r>
               <a:rPr lang="en-US" sz="4400"/>
-              <a:t>Question 4 of 10 in round 06</a:t>
+              <a:t>Question 6 of 10 in round 04</a:t>
             </a:r>
             <a:endParaRPr lang="en-US" sz="1100"/>
           </a:p>
@@ -10608,7 +10608,7 @@
             <a:pPr algn="l"/>
             <a:r>
               <a:rPr lang="en-US" sz="4400"/>
-              <a:t>Question 5 of 10 in round 06</a:t>
+              <a:t>Question 6 of 10 in round 05</a:t>
             </a:r>
             <a:endParaRPr lang="en-US" sz="1100"/>
           </a:p>
@@ -10770,7 +10770,7 @@
             <a:pPr algn="l"/>
             <a:r>
               <a:rPr lang="en-US" sz="4400"/>
-              <a:t>Question 7 of 10 in round 06</a:t>
+              <a:t>Question 6 of 10 in round 07</a:t>
             </a:r>
             <a:endParaRPr lang="en-US" sz="1100"/>
           </a:p>
@@ -10851,7 +10851,7 @@
             <a:pPr algn="l"/>
             <a:r>
               <a:rPr lang="en-US" sz="4400"/>
-              <a:t>Question 8 of 10 in round 06</a:t>
+              <a:t>Question 6 of 10 in round 08</a:t>
             </a:r>
             <a:endParaRPr lang="en-US" sz="1100"/>
           </a:p>
@@ -10932,7 +10932,7 @@
             <a:pPr algn="l"/>
             <a:r>
               <a:rPr lang="en-US" sz="4400"/>
-              <a:t>Question 3 of 10 in round 01</a:t>
+              <a:t>Question 1 of 10 in round 03</a:t>
             </a:r>
             <a:endParaRPr lang="en-US" sz="1100"/>
           </a:p>
@@ -11013,7 +11013,7 @@
             <a:pPr algn="l"/>
             <a:r>
               <a:rPr lang="en-US" sz="4400"/>
-              <a:t>Question 9 of 10 in round 06</a:t>
+              <a:t>Question 6 of 10 in round 09</a:t>
             </a:r>
             <a:endParaRPr lang="en-US" sz="1100"/>
           </a:p>
@@ -11094,7 +11094,7 @@
             <a:pPr algn="l"/>
             <a:r>
               <a:rPr lang="en-US" sz="4400"/>
-              <a:t>Question 10 of 10 in round 06</a:t>
+              <a:t>Question 6 of 10 in round 10</a:t>
             </a:r>
             <a:endParaRPr lang="en-US" sz="1100"/>
           </a:p>
@@ -11351,7 +11351,7 @@
             <a:pPr algn="l"/>
             <a:r>
               <a:rPr lang="en-US" sz="4400"/>
-              <a:t>Question 1 of 10 in round 06</a:t>
+              <a:t>Question 6 of 10 in round 01</a:t>
             </a:r>
             <a:endParaRPr lang="en-US" sz="1100"/>
           </a:p>
@@ -11432,7 +11432,7 @@
             <a:pPr algn="l"/>
             <a:r>
               <a:rPr lang="en-US" sz="4400"/>
-              <a:t>Question 1 of 10 in round 06</a:t>
+              <a:t>Question 6 of 10 in round 01</a:t>
             </a:r>
             <a:endParaRPr lang="en-US" sz="1100"/>
           </a:p>
@@ -11460,7 +11460,7 @@
             <a:pPr algn="l"/>
             <a:r>
               <a:rPr lang="en-US" sz="3600"/>
-              <a:t>Answer 1 of 10 in round 06</a:t>
+              <a:t>Answer 6 of 10 in round 01</a:t>
             </a:r>
             <a:endParaRPr lang="en-US" sz="1100"/>
           </a:p>
@@ -11541,7 +11541,7 @@
             <a:pPr algn="l"/>
             <a:r>
               <a:rPr lang="en-US" sz="4400"/>
-              <a:t>Question 2 of 10 in round 06</a:t>
+              <a:t>Question 6 of 10 in round 02</a:t>
             </a:r>
             <a:endParaRPr lang="en-US" sz="1100"/>
           </a:p>
@@ -11622,7 +11622,7 @@
             <a:pPr algn="l"/>
             <a:r>
               <a:rPr lang="en-US" sz="4400"/>
-              <a:t>Question 2 of 10 in round 06</a:t>
+              <a:t>Question 6 of 10 in round 02</a:t>
             </a:r>
             <a:endParaRPr lang="en-US" sz="1100"/>
           </a:p>
@@ -11650,7 +11650,7 @@
             <a:pPr algn="l"/>
             <a:r>
               <a:rPr lang="en-US" sz="3600"/>
-              <a:t>Answer 2 of 10 in round 06</a:t>
+              <a:t>Answer 6 of 10 in round 02</a:t>
             </a:r>
             <a:endParaRPr lang="en-US" sz="1100"/>
           </a:p>
@@ -11731,7 +11731,7 @@
             <a:pPr algn="l"/>
             <a:r>
               <a:rPr lang="en-US" sz="4400"/>
-              <a:t>Question 3 of 10 in round 06</a:t>
+              <a:t>Question 6 of 10 in round 03</a:t>
             </a:r>
             <a:endParaRPr lang="en-US" sz="1100"/>
           </a:p>
@@ -11812,7 +11812,7 @@
             <a:pPr algn="l"/>
             <a:r>
               <a:rPr lang="en-US" sz="4400"/>
-              <a:t>Question 3 of 10 in round 06</a:t>
+              <a:t>Question 6 of 10 in round 03</a:t>
             </a:r>
             <a:endParaRPr lang="en-US" sz="1100"/>
           </a:p>
@@ -11840,7 +11840,7 @@
             <a:pPr algn="l"/>
             <a:r>
               <a:rPr lang="en-US" sz="3600"/>
-              <a:t>Answer 3 of 10 in round 06</a:t>
+              <a:t>Answer 6 of 10 in round 03</a:t>
             </a:r>
             <a:endParaRPr lang="en-US" sz="1100"/>
           </a:p>
@@ -11921,7 +11921,7 @@
             <a:pPr algn="l"/>
             <a:r>
               <a:rPr lang="en-US" sz="4400"/>
-              <a:t>Question 4 of 10 in round 06</a:t>
+              <a:t>Question 6 of 10 in round 04</a:t>
             </a:r>
             <a:endParaRPr lang="en-US" sz="1100"/>
           </a:p>
@@ -12002,7 +12002,7 @@
             <a:pPr algn="l"/>
             <a:r>
               <a:rPr lang="en-US" sz="4400"/>
-              <a:t>Question 3 of 10 in round 01</a:t>
+              <a:t>Question 1 of 10 in round 03</a:t>
             </a:r>
             <a:endParaRPr lang="en-US" sz="1100"/>
           </a:p>
@@ -12030,7 +12030,7 @@
             <a:pPr algn="l"/>
             <a:r>
               <a:rPr lang="en-US" sz="3600"/>
-              <a:t>Answer 3 of 10 in round 01</a:t>
+              <a:t>Answer 1 of 10 in round 03</a:t>
             </a:r>
             <a:endParaRPr lang="en-US" sz="1100"/>
           </a:p>
@@ -12111,7 +12111,7 @@
             <a:pPr algn="l"/>
             <a:r>
               <a:rPr lang="en-US" sz="4400"/>
-              <a:t>Question 4 of 10 in round 06</a:t>
+              <a:t>Question 6 of 10 in round 04</a:t>
             </a:r>
             <a:endParaRPr lang="en-US" sz="1100"/>
           </a:p>
@@ -12139,7 +12139,7 @@
             <a:pPr algn="l"/>
             <a:r>
               <a:rPr lang="en-US" sz="3600"/>
-              <a:t>Answer 4 of 10 in round 06</a:t>
+              <a:t>Answer 6 of 10 in round 04</a:t>
             </a:r>
             <a:endParaRPr lang="en-US" sz="1100"/>
           </a:p>
@@ -12220,7 +12220,7 @@
             <a:pPr algn="l"/>
             <a:r>
               <a:rPr lang="en-US" sz="4400"/>
-              <a:t>Question 5 of 10 in round 06</a:t>
+              <a:t>Question 6 of 10 in round 05</a:t>
             </a:r>
             <a:endParaRPr lang="en-US" sz="1100"/>
           </a:p>
@@ -12301,7 +12301,7 @@
             <a:pPr algn="l"/>
             <a:r>
               <a:rPr lang="en-US" sz="4400"/>
-              <a:t>Question 5 of 10 in round 06</a:t>
+              <a:t>Question 6 of 10 in round 05</a:t>
             </a:r>
             <a:endParaRPr lang="en-US" sz="1100"/>
           </a:p>
@@ -12329,7 +12329,7 @@
             <a:pPr algn="l"/>
             <a:r>
               <a:rPr lang="en-US" sz="3600"/>
-              <a:t>Answer 5 of 10 in round 06</a:t>
+              <a:t>Answer 6 of 10 in round 05</a:t>
             </a:r>
             <a:endParaRPr lang="en-US" sz="1100"/>
           </a:p>
@@ -12600,7 +12600,7 @@
             <a:pPr algn="l"/>
             <a:r>
               <a:rPr lang="en-US" sz="4400"/>
-              <a:t>Question 7 of 10 in round 06</a:t>
+              <a:t>Question 6 of 10 in round 07</a:t>
             </a:r>
             <a:endParaRPr lang="en-US" sz="1100"/>
           </a:p>
@@ -12681,7 +12681,7 @@
             <a:pPr algn="l"/>
             <a:r>
               <a:rPr lang="en-US" sz="4400"/>
-              <a:t>Question 7 of 10 in round 06</a:t>
+              <a:t>Question 6 of 10 in round 07</a:t>
             </a:r>
             <a:endParaRPr lang="en-US" sz="1100"/>
           </a:p>
@@ -12709,7 +12709,7 @@
             <a:pPr algn="l"/>
             <a:r>
               <a:rPr lang="en-US" sz="3600"/>
-              <a:t>Answer 7 of 10 in round 06</a:t>
+              <a:t>Answer 6 of 10 in round 07</a:t>
             </a:r>
             <a:endParaRPr lang="en-US" sz="1100"/>
           </a:p>
@@ -12790,7 +12790,7 @@
             <a:pPr algn="l"/>
             <a:r>
               <a:rPr lang="en-US" sz="4400"/>
-              <a:t>Question 8 of 10 in round 06</a:t>
+              <a:t>Question 6 of 10 in round 08</a:t>
             </a:r>
             <a:endParaRPr lang="en-US" sz="1100"/>
           </a:p>
@@ -12871,7 +12871,7 @@
             <a:pPr algn="l"/>
             <a:r>
               <a:rPr lang="en-US" sz="4400"/>
-              <a:t>Question 8 of 10 in round 06</a:t>
+              <a:t>Question 6 of 10 in round 08</a:t>
             </a:r>
             <a:endParaRPr lang="en-US" sz="1100"/>
           </a:p>
@@ -12899,7 +12899,7 @@
             <a:pPr algn="l"/>
             <a:r>
               <a:rPr lang="en-US" sz="3600"/>
-              <a:t>Answer 8 of 10 in round 06</a:t>
+              <a:t>Answer 6 of 10 in round 08</a:t>
             </a:r>
             <a:endParaRPr lang="en-US" sz="1100"/>
           </a:p>
@@ -12980,7 +12980,7 @@
             <a:pPr algn="l"/>
             <a:r>
               <a:rPr lang="en-US" sz="4400"/>
-              <a:t>Question 9 of 10 in round 06</a:t>
+              <a:t>Question 6 of 10 in round 09</a:t>
             </a:r>
             <a:endParaRPr lang="en-US" sz="1100"/>
           </a:p>
@@ -13061,7 +13061,7 @@
             <a:pPr algn="l"/>
             <a:r>
               <a:rPr lang="en-US" sz="4400"/>
-              <a:t>Question 4 of 10 in round 01</a:t>
+              <a:t>Question 1 of 10 in round 04</a:t>
             </a:r>
             <a:endParaRPr lang="en-US" sz="1100"/>
           </a:p>
@@ -13142,7 +13142,7 @@
             <a:pPr algn="l"/>
             <a:r>
               <a:rPr lang="en-US" sz="4400"/>
-              <a:t>Question 9 of 10 in round 06</a:t>
+              <a:t>Question 6 of 10 in round 09</a:t>
             </a:r>
             <a:endParaRPr lang="en-US" sz="1100"/>
           </a:p>
@@ -13170,7 +13170,7 @@
             <a:pPr algn="l"/>
             <a:r>
               <a:rPr lang="en-US" sz="3600"/>
-              <a:t>Answer 9 of 10 in round 06</a:t>
+              <a:t>Answer 6 of 10 in round 09</a:t>
             </a:r>
             <a:endParaRPr lang="en-US" sz="1100"/>
           </a:p>
@@ -13251,7 +13251,7 @@
             <a:pPr algn="l"/>
             <a:r>
               <a:rPr lang="en-US" sz="4400"/>
-              <a:t>Question 10 of 10 in round 06</a:t>
+              <a:t>Question 6 of 10 in round 10</a:t>
             </a:r>
             <a:endParaRPr lang="en-US" sz="1100"/>
           </a:p>
@@ -13332,7 +13332,7 @@
             <a:pPr algn="l"/>
             <a:r>
               <a:rPr lang="en-US" sz="4400"/>
-              <a:t>Question 10 of 10 in round 06</a:t>
+              <a:t>Question 6 of 10 in round 10</a:t>
             </a:r>
             <a:endParaRPr lang="en-US" sz="1100"/>
           </a:p>
@@ -13360,7 +13360,7 @@
             <a:pPr algn="l"/>
             <a:r>
               <a:rPr lang="en-US" sz="3600"/>
-              <a:t>Answer 10 of 10 in round 06</a:t>
+              <a:t>Answer 6 of 10 in round 10</a:t>
             </a:r>
             <a:endParaRPr lang="en-US" sz="1100"/>
           </a:p>
@@ -13617,7 +13617,7 @@
             <a:pPr algn="l"/>
             <a:r>
               <a:rPr lang="en-US" sz="4400"/>
-              <a:t>Question 1 of 10 in round 07</a:t>
+              <a:t>Question 7 of 10 in round 01</a:t>
             </a:r>
             <a:endParaRPr lang="en-US" sz="1100"/>
           </a:p>
@@ -13698,7 +13698,7 @@
             <a:pPr algn="l"/>
             <a:r>
               <a:rPr lang="en-US" sz="4400"/>
-              <a:t>Question 2 of 10 in round 07</a:t>
+              <a:t>Question 7 of 10 in round 02</a:t>
             </a:r>
             <a:endParaRPr lang="en-US" sz="1100"/>
           </a:p>
@@ -13779,7 +13779,7 @@
             <a:pPr algn="l"/>
             <a:r>
               <a:rPr lang="en-US" sz="4400"/>
-              <a:t>Question 3 of 10 in round 07</a:t>
+              <a:t>Question 7 of 10 in round 03</a:t>
             </a:r>
             <a:endParaRPr lang="en-US" sz="1100"/>
           </a:p>
@@ -13860,7 +13860,7 @@
             <a:pPr algn="l"/>
             <a:r>
               <a:rPr lang="en-US" sz="4400"/>
-              <a:t>Question 4 of 10 in round 07</a:t>
+              <a:t>Question 7 of 10 in round 04</a:t>
             </a:r>
             <a:endParaRPr lang="en-US" sz="1100"/>
           </a:p>
@@ -13941,7 +13941,7 @@
             <a:pPr algn="l"/>
             <a:r>
               <a:rPr lang="en-US" sz="4400"/>
-              <a:t>Question 5 of 10 in round 07</a:t>
+              <a:t>Question 7 of 10 in round 05</a:t>
             </a:r>
             <a:endParaRPr lang="en-US" sz="1100"/>
           </a:p>
@@ -14022,7 +14022,7 @@
             <a:pPr algn="l"/>
             <a:r>
               <a:rPr lang="en-US" sz="4400"/>
-              <a:t>Question 6 of 10 in round 07</a:t>
+              <a:t>Question 7 of 10 in round 06</a:t>
             </a:r>
             <a:endParaRPr lang="en-US" sz="1100"/>
           </a:p>
@@ -14184,7 +14184,7 @@
             <a:pPr algn="l"/>
             <a:r>
               <a:rPr lang="en-US" sz="4400"/>
-              <a:t>Question 4 of 10 in round 01</a:t>
+              <a:t>Question 1 of 10 in round 04</a:t>
             </a:r>
             <a:endParaRPr lang="en-US" sz="1100"/>
           </a:p>
@@ -14212,7 +14212,7 @@
             <a:pPr algn="l"/>
             <a:r>
               <a:rPr lang="en-US" sz="3600"/>
-              <a:t>Answer 4 of 10 in round 01</a:t>
+              <a:t>Answer 1 of 10 in round 04</a:t>
             </a:r>
             <a:endParaRPr lang="en-US" sz="1100"/>
           </a:p>
@@ -14374,7 +14374,7 @@
             <a:pPr algn="l"/>
             <a:r>
               <a:rPr lang="en-US" sz="4400"/>
-              <a:t>Question 8 of 10 in round 07</a:t>
+              <a:t>Question 7 of 10 in round 08</a:t>
             </a:r>
             <a:endParaRPr lang="en-US" sz="1100"/>
           </a:p>
@@ -14455,7 +14455,7 @@
             <a:pPr algn="l"/>
             <a:r>
               <a:rPr lang="en-US" sz="4400"/>
-              <a:t>Question 9 of 10 in round 07</a:t>
+              <a:t>Question 7 of 10 in round 09</a:t>
             </a:r>
             <a:endParaRPr lang="en-US" sz="1100"/>
           </a:p>
@@ -14536,7 +14536,7 @@
             <a:pPr algn="l"/>
             <a:r>
               <a:rPr lang="en-US" sz="4400"/>
-              <a:t>Question 10 of 10 in round 07</a:t>
+              <a:t>Question 7 of 10 in round 10</a:t>
             </a:r>
             <a:endParaRPr lang="en-US" sz="1100"/>
           </a:p>
@@ -14793,7 +14793,7 @@
             <a:pPr algn="l"/>
             <a:r>
               <a:rPr lang="en-US" sz="4400"/>
-              <a:t>Question 1 of 10 in round 07</a:t>
+              <a:t>Question 7 of 10 in round 01</a:t>
             </a:r>
             <a:endParaRPr lang="en-US" sz="1100"/>
           </a:p>
@@ -14874,7 +14874,7 @@
             <a:pPr algn="l"/>
             <a:r>
               <a:rPr lang="en-US" sz="4400"/>
-              <a:t>Question 1 of 10 in round 07</a:t>
+              <a:t>Question 7 of 10 in round 01</a:t>
             </a:r>
             <a:endParaRPr lang="en-US" sz="1100"/>
           </a:p>
@@ -14902,7 +14902,7 @@
             <a:pPr algn="l"/>
             <a:r>
               <a:rPr lang="en-US" sz="3600"/>
-              <a:t>Answer 1 of 10 in round 07</a:t>
+              <a:t>Answer 7 of 10 in round 01</a:t>
             </a:r>
             <a:endParaRPr lang="en-US" sz="1100"/>
           </a:p>
@@ -14983,7 +14983,7 @@
             <a:pPr algn="l"/>
             <a:r>
               <a:rPr lang="en-US" sz="4400"/>
-              <a:t>Question 2 of 10 in round 07</a:t>
+              <a:t>Question 7 of 10 in round 02</a:t>
             </a:r>
             <a:endParaRPr lang="en-US" sz="1100"/>
           </a:p>
@@ -15064,7 +15064,7 @@
             <a:pPr algn="l"/>
             <a:r>
               <a:rPr lang="en-US" sz="4400"/>
-              <a:t>Question 2 of 10 in round 07</a:t>
+              <a:t>Question 7 of 10 in round 02</a:t>
             </a:r>
             <a:endParaRPr lang="en-US" sz="1100"/>
           </a:p>
@@ -15092,7 +15092,7 @@
             <a:pPr algn="l"/>
             <a:r>
               <a:rPr lang="en-US" sz="3600"/>
-              <a:t>Answer 2 of 10 in round 07</a:t>
+              <a:t>Answer 7 of 10 in round 02</a:t>
             </a:r>
             <a:endParaRPr lang="en-US" sz="1100"/>
           </a:p>
@@ -15173,7 +15173,7 @@
             <a:pPr algn="l"/>
             <a:r>
               <a:rPr lang="en-US" sz="4400"/>
-              <a:t>Question 3 of 10 in round 07</a:t>
+              <a:t>Question 7 of 10 in round 03</a:t>
             </a:r>
             <a:endParaRPr lang="en-US" sz="1100"/>
           </a:p>
@@ -15254,7 +15254,7 @@
             <a:pPr algn="l"/>
             <a:r>
               <a:rPr lang="en-US" sz="4400"/>
-              <a:t>Question 5 of 10 in round 01</a:t>
+              <a:t>Question 1 of 10 in round 05</a:t>
             </a:r>
             <a:endParaRPr lang="en-US" sz="1100"/>
           </a:p>
@@ -15335,7 +15335,7 @@
             <a:pPr algn="l"/>
             <a:r>
               <a:rPr lang="en-US" sz="4400"/>
-              <a:t>Question 3 of 10 in round 07</a:t>
+              <a:t>Question 7 of 10 in round 03</a:t>
             </a:r>
             <a:endParaRPr lang="en-US" sz="1100"/>
           </a:p>
@@ -15363,7 +15363,7 @@
             <a:pPr algn="l"/>
             <a:r>
               <a:rPr lang="en-US" sz="3600"/>
-              <a:t>Answer 3 of 10 in round 07</a:t>
+              <a:t>Answer 7 of 10 in round 03</a:t>
             </a:r>
             <a:endParaRPr lang="en-US" sz="1100"/>
           </a:p>
@@ -15444,7 +15444,7 @@
             <a:pPr algn="l"/>
             <a:r>
               <a:rPr lang="en-US" sz="4400"/>
-              <a:t>Question 4 of 10 in round 07</a:t>
+              <a:t>Question 7 of 10 in round 04</a:t>
             </a:r>
             <a:endParaRPr lang="en-US" sz="1100"/>
           </a:p>
@@ -15525,7 +15525,7 @@
             <a:pPr algn="l"/>
             <a:r>
               <a:rPr lang="en-US" sz="4400"/>
-              <a:t>Question 4 of 10 in round 07</a:t>
+              <a:t>Question 7 of 10 in round 04</a:t>
             </a:r>
             <a:endParaRPr lang="en-US" sz="1100"/>
           </a:p>
@@ -15553,7 +15553,7 @@
             <a:pPr algn="l"/>
             <a:r>
               <a:rPr lang="en-US" sz="3600"/>
-              <a:t>Answer 4 of 10 in round 07</a:t>
+              <a:t>Answer 7 of 10 in round 04</a:t>
             </a:r>
             <a:endParaRPr lang="en-US" sz="1100"/>
           </a:p>
@@ -15634,7 +15634,7 @@
             <a:pPr algn="l"/>
             <a:r>
               <a:rPr lang="en-US" sz="4400"/>
-              <a:t>Question 5 of 10 in round 07</a:t>
+              <a:t>Question 7 of 10 in round 05</a:t>
             </a:r>
             <a:endParaRPr lang="en-US" sz="1100"/>
           </a:p>
@@ -15715,7 +15715,7 @@
             <a:pPr algn="l"/>
             <a:r>
               <a:rPr lang="en-US" sz="4400"/>
-              <a:t>Question 5 of 10 in round 07</a:t>
+              <a:t>Question 7 of 10 in round 05</a:t>
             </a:r>
             <a:endParaRPr lang="en-US" sz="1100"/>
           </a:p>
@@ -15743,7 +15743,7 @@
             <a:pPr algn="l"/>
             <a:r>
               <a:rPr lang="en-US" sz="3600"/>
-              <a:t>Answer 5 of 10 in round 07</a:t>
+              <a:t>Answer 7 of 10 in round 05</a:t>
             </a:r>
             <a:endParaRPr lang="en-US" sz="1100"/>
           </a:p>
@@ -15824,7 +15824,7 @@
             <a:pPr algn="l"/>
             <a:r>
               <a:rPr lang="en-US" sz="4400"/>
-              <a:t>Question 6 of 10 in round 07</a:t>
+              <a:t>Question 7 of 10 in round 06</a:t>
             </a:r>
             <a:endParaRPr lang="en-US" sz="1100"/>
           </a:p>
@@ -15905,7 +15905,7 @@
             <a:pPr algn="l"/>
             <a:r>
               <a:rPr lang="en-US" sz="4400"/>
-              <a:t>Question 6 of 10 in round 07</a:t>
+              <a:t>Question 7 of 10 in round 06</a:t>
             </a:r>
             <a:endParaRPr lang="en-US" sz="1100"/>
           </a:p>
@@ -15933,7 +15933,7 @@
             <a:pPr algn="l"/>
             <a:r>
               <a:rPr lang="en-US" sz="3600"/>
-              <a:t>Answer 6 of 10 in round 07</a:t>
+              <a:t>Answer 7 of 10 in round 06</a:t>
             </a:r>
             <a:endParaRPr lang="en-US" sz="1100"/>
           </a:p>
@@ -16204,7 +16204,7 @@
             <a:pPr algn="l"/>
             <a:r>
               <a:rPr lang="en-US" sz="4400"/>
-              <a:t>Question 8 of 10 in round 07</a:t>
+              <a:t>Question 7 of 10 in round 08</a:t>
             </a:r>
             <a:endParaRPr lang="en-US" sz="1100"/>
           </a:p>
@@ -16285,7 +16285,7 @@
             <a:pPr algn="l"/>
             <a:r>
               <a:rPr lang="en-US" sz="4400"/>
-              <a:t>Question 5 of 10 in round 01</a:t>
+              <a:t>Question 1 of 10 in round 05</a:t>
             </a:r>
             <a:endParaRPr lang="en-US" sz="1100"/>
           </a:p>
@@ -16313,7 +16313,7 @@
             <a:pPr algn="l"/>
             <a:r>
               <a:rPr lang="en-US" sz="3600"/>
-              <a:t>Answer 5 of 10 in round 01</a:t>
+              <a:t>Answer 1 of 10 in round 05</a:t>
             </a:r>
             <a:endParaRPr lang="en-US" sz="1100"/>
           </a:p>
@@ -16394,7 +16394,7 @@
             <a:pPr algn="l"/>
             <a:r>
               <a:rPr lang="en-US" sz="4400"/>
-              <a:t>Question 8 of 10 in round 07</a:t>
+              <a:t>Question 7 of 10 in round 08</a:t>
             </a:r>
             <a:endParaRPr lang="en-US" sz="1100"/>
           </a:p>
@@ -16422,7 +16422,7 @@
             <a:pPr algn="l"/>
             <a:r>
               <a:rPr lang="en-US" sz="3600"/>
-              <a:t>Answer 8 of 10 in round 07</a:t>
+              <a:t>Answer 7 of 10 in round 08</a:t>
             </a:r>
             <a:endParaRPr lang="en-US" sz="1100"/>
           </a:p>
@@ -16503,7 +16503,7 @@
             <a:pPr algn="l"/>
             <a:r>
               <a:rPr lang="en-US" sz="4400"/>
-              <a:t>Question 9 of 10 in round 07</a:t>
+              <a:t>Question 7 of 10 in round 09</a:t>
             </a:r>
             <a:endParaRPr lang="en-US" sz="1100"/>
           </a:p>
@@ -16584,7 +16584,7 @@
             <a:pPr algn="l"/>
             <a:r>
               <a:rPr lang="en-US" sz="4400"/>
-              <a:t>Question 9 of 10 in round 07</a:t>
+              <a:t>Question 7 of 10 in round 09</a:t>
             </a:r>
             <a:endParaRPr lang="en-US" sz="1100"/>
           </a:p>
@@ -16612,7 +16612,7 @@
             <a:pPr algn="l"/>
             <a:r>
               <a:rPr lang="en-US" sz="3600"/>
-              <a:t>Answer 9 of 10 in round 07</a:t>
+              <a:t>Answer 7 of 10 in round 09</a:t>
             </a:r>
             <a:endParaRPr lang="en-US" sz="1100"/>
           </a:p>
@@ -16693,7 +16693,7 @@
             <a:pPr algn="l"/>
             <a:r>
               <a:rPr lang="en-US" sz="4400"/>
-              <a:t>Question 10 of 10 in round 07</a:t>
+              <a:t>Question 7 of 10 in round 10</a:t>
             </a:r>
             <a:endParaRPr lang="en-US" sz="1100"/>
           </a:p>
@@ -16774,7 +16774,7 @@
             <a:pPr algn="l"/>
             <a:r>
               <a:rPr lang="en-US" sz="4400"/>
-              <a:t>Question 10 of 10 in round 07</a:t>
+              <a:t>Question 7 of 10 in round 10</a:t>
             </a:r>
             <a:endParaRPr lang="en-US" sz="1100"/>
           </a:p>
@@ -16802,7 +16802,7 @@
             <a:pPr algn="l"/>
             <a:r>
               <a:rPr lang="en-US" sz="3600"/>
-              <a:t>Answer 10 of 10 in round 07</a:t>
+              <a:t>Answer 7 of 10 in round 10</a:t>
             </a:r>
             <a:endParaRPr lang="en-US" sz="1100"/>
           </a:p>
@@ -17059,7 +17059,7 @@
             <a:pPr algn="l"/>
             <a:r>
               <a:rPr lang="en-US" sz="4400"/>
-              <a:t>Question 1 of 10 in round 08</a:t>
+              <a:t>Question 8 of 10 in round 01</a:t>
             </a:r>
             <a:endParaRPr lang="en-US" sz="1100"/>
           </a:p>
@@ -17140,7 +17140,7 @@
             <a:pPr algn="l"/>
             <a:r>
               <a:rPr lang="en-US" sz="4400"/>
-              <a:t>Question 2 of 10 in round 08</a:t>
+              <a:t>Question 8 of 10 in round 02</a:t>
             </a:r>
             <a:endParaRPr lang="en-US" sz="1100"/>
           </a:p>
@@ -17221,7 +17221,7 @@
             <a:pPr algn="l"/>
             <a:r>
               <a:rPr lang="en-US" sz="4400"/>
-              <a:t>Question 3 of 10 in round 08</a:t>
+              <a:t>Question 8 of 10 in round 03</a:t>
             </a:r>
             <a:endParaRPr lang="en-US" sz="1100"/>
           </a:p>
@@ -17302,7 +17302,7 @@
             <a:pPr algn="l"/>
             <a:r>
               <a:rPr lang="en-US" sz="4400"/>
-              <a:t>Question 4 of 10 in round 08</a:t>
+              <a:t>Question 8 of 10 in round 04</a:t>
             </a:r>
             <a:endParaRPr lang="en-US" sz="1100"/>
           </a:p>
@@ -17383,7 +17383,7 @@
             <a:pPr algn="l"/>
             <a:r>
               <a:rPr lang="en-US" sz="4400"/>
-              <a:t>Question 6 of 10 in round 01</a:t>
+              <a:t>Question 1 of 10 in round 06</a:t>
             </a:r>
             <a:endParaRPr lang="en-US" sz="1100"/>
           </a:p>
@@ -17464,7 +17464,7 @@
             <a:pPr algn="l"/>
             <a:r>
               <a:rPr lang="en-US" sz="4400"/>
-              <a:t>Question 5 of 10 in round 08</a:t>
+              <a:t>Question 8 of 10 in round 05</a:t>
             </a:r>
             <a:endParaRPr lang="en-US" sz="1100"/>
           </a:p>
@@ -17545,7 +17545,7 @@
             <a:pPr algn="l"/>
             <a:r>
               <a:rPr lang="en-US" sz="4400"/>
-              <a:t>Question 6 of 10 in round 08</a:t>
+              <a:t>Question 8 of 10 in round 06</a:t>
             </a:r>
             <a:endParaRPr lang="en-US" sz="1100"/>
           </a:p>
@@ -17626,7 +17626,7 @@
             <a:pPr algn="l"/>
             <a:r>
               <a:rPr lang="en-US" sz="4400"/>
-              <a:t>Question 7 of 10 in round 08</a:t>
+              <a:t>Question 8 of 10 in round 07</a:t>
             </a:r>
             <a:endParaRPr lang="en-US" sz="1100"/>
           </a:p>
@@ -17788,7 +17788,7 @@
             <a:pPr algn="l"/>
             <a:r>
               <a:rPr lang="en-US" sz="4400"/>
-              <a:t>Question 9 of 10 in round 08</a:t>
+              <a:t>Question 8 of 10 in round 09</a:t>
             </a:r>
             <a:endParaRPr lang="en-US" sz="1100"/>
           </a:p>
@@ -17869,7 +17869,7 @@
             <a:pPr algn="l"/>
             <a:r>
               <a:rPr lang="en-US" sz="4400"/>
-              <a:t>Question 10 of 10 in round 08</a:t>
+              <a:t>Question 8 of 10 in round 10</a:t>
             </a:r>
             <a:endParaRPr lang="en-US" sz="1100"/>
           </a:p>
@@ -18126,7 +18126,7 @@
             <a:pPr algn="l"/>
             <a:r>
               <a:rPr lang="en-US" sz="4400"/>
-              <a:t>Question 1 of 10 in round 08</a:t>
+              <a:t>Question 8 of 10 in round 01</a:t>
             </a:r>
             <a:endParaRPr lang="en-US" sz="1100"/>
           </a:p>
@@ -18207,7 +18207,7 @@
             <a:pPr algn="l"/>
             <a:r>
               <a:rPr lang="en-US" sz="4400"/>
-              <a:t>Question 1 of 10 in round 08</a:t>
+              <a:t>Question 8 of 10 in round 01</a:t>
             </a:r>
             <a:endParaRPr lang="en-US" sz="1100"/>
           </a:p>
@@ -18235,7 +18235,7 @@
             <a:pPr algn="l"/>
             <a:r>
               <a:rPr lang="en-US" sz="3600"/>
-              <a:t>Answer 1 of 10 in round 08</a:t>
+              <a:t>Answer 8 of 10 in round 01</a:t>
             </a:r>
             <a:endParaRPr lang="en-US" sz="1100"/>
           </a:p>
@@ -18316,7 +18316,7 @@
             <a:pPr algn="l"/>
             <a:r>
               <a:rPr lang="en-US" sz="4400"/>
-              <a:t>Question 2 of 10 in round 08</a:t>
+              <a:t>Question 8 of 10 in round 02</a:t>
             </a:r>
             <a:endParaRPr lang="en-US" sz="1100"/>
           </a:p>
@@ -18397,7 +18397,7 @@
             <a:pPr algn="l"/>
             <a:r>
               <a:rPr lang="en-US" sz="4400"/>
-              <a:t>Question 6 of 10 in round 01</a:t>
+              <a:t>Question 1 of 10 in round 06</a:t>
             </a:r>
             <a:endParaRPr lang="en-US" sz="1100"/>
           </a:p>
@@ -18425,7 +18425,7 @@
             <a:pPr algn="l"/>
             <a:r>
               <a:rPr lang="en-US" sz="3600"/>
-              <a:t>Answer 6 of 10 in round 01</a:t>
+              <a:t>Answer 1 of 10 in round 06</a:t>
             </a:r>
             <a:endParaRPr lang="en-US" sz="1100"/>
           </a:p>
@@ -18506,7 +18506,7 @@
             <a:pPr algn="l"/>
             <a:r>
               <a:rPr lang="en-US" sz="4400"/>
-              <a:t>Question 2 of 10 in round 08</a:t>
+              <a:t>Question 8 of 10 in round 02</a:t>
             </a:r>
             <a:endParaRPr lang="en-US" sz="1100"/>
           </a:p>
@@ -18534,7 +18534,7 @@
             <a:pPr algn="l"/>
             <a:r>
               <a:rPr lang="en-US" sz="3600"/>
-              <a:t>Answer 2 of 10 in round 08</a:t>
+              <a:t>Answer 8 of 10 in round 02</a:t>
             </a:r>
             <a:endParaRPr lang="en-US" sz="1100"/>
           </a:p>
@@ -18615,7 +18615,7 @@
             <a:pPr algn="l"/>
             <a:r>
               <a:rPr lang="en-US" sz="4400"/>
-              <a:t>Question 3 of 10 in round 08</a:t>
+              <a:t>Question 8 of 10 in round 03</a:t>
             </a:r>
             <a:endParaRPr lang="en-US" sz="1100"/>
           </a:p>
@@ -18696,7 +18696,7 @@
             <a:pPr algn="l"/>
             <a:r>
               <a:rPr lang="en-US" sz="4400"/>
-              <a:t>Question 3 of 10 in round 08</a:t>
+              <a:t>Question 8 of 10 in round 03</a:t>
             </a:r>
             <a:endParaRPr lang="en-US" sz="1100"/>
           </a:p>
@@ -18724,7 +18724,7 @@
             <a:pPr algn="l"/>
             <a:r>
               <a:rPr lang="en-US" sz="3600"/>
-              <a:t>Answer 3 of 10 in round 08</a:t>
+              <a:t>Answer 8 of 10 in round 03</a:t>
             </a:r>
             <a:endParaRPr lang="en-US" sz="1100"/>
           </a:p>
@@ -18805,7 +18805,7 @@
             <a:pPr algn="l"/>
             <a:r>
               <a:rPr lang="en-US" sz="4400"/>
-              <a:t>Question 4 of 10 in round 08</a:t>
+              <a:t>Question 8 of 10 in round 04</a:t>
             </a:r>
             <a:endParaRPr lang="en-US" sz="1100"/>
           </a:p>
@@ -18886,7 +18886,7 @@
             <a:pPr algn="l"/>
             <a:r>
               <a:rPr lang="en-US" sz="4400"/>
-              <a:t>Question 4 of 10 in round 08</a:t>
+              <a:t>Question 8 of 10 in round 04</a:t>
             </a:r>
             <a:endParaRPr lang="en-US" sz="1100"/>
           </a:p>
@@ -18914,7 +18914,7 @@
             <a:pPr algn="l"/>
             <a:r>
               <a:rPr lang="en-US" sz="3600"/>
-              <a:t>Answer 4 of 10 in round 08</a:t>
+              <a:t>Answer 8 of 10 in round 04</a:t>
             </a:r>
             <a:endParaRPr lang="en-US" sz="1100"/>
           </a:p>
@@ -18995,7 +18995,7 @@
             <a:pPr algn="l"/>
             <a:r>
               <a:rPr lang="en-US" sz="4400"/>
-              <a:t>Question 5 of 10 in round 08</a:t>
+              <a:t>Question 8 of 10 in round 05</a:t>
             </a:r>
             <a:endParaRPr lang="en-US" sz="1100"/>
           </a:p>
@@ -19076,7 +19076,7 @@
             <a:pPr algn="l"/>
             <a:r>
               <a:rPr lang="en-US" sz="4400"/>
-              <a:t>Question 5 of 10 in round 08</a:t>
+              <a:t>Question 8 of 10 in round 05</a:t>
             </a:r>
             <a:endParaRPr lang="en-US" sz="1100"/>
           </a:p>
@@ -19104,7 +19104,7 @@
             <a:pPr algn="l"/>
             <a:r>
               <a:rPr lang="en-US" sz="3600"/>
-              <a:t>Answer 5 of 10 in round 08</a:t>
+              <a:t>Answer 8 of 10 in round 05</a:t>
             </a:r>
             <a:endParaRPr lang="en-US" sz="1100"/>
           </a:p>
@@ -19185,7 +19185,7 @@
             <a:pPr algn="l"/>
             <a:r>
               <a:rPr lang="en-US" sz="4400"/>
-              <a:t>Question 6 of 10 in round 08</a:t>
+              <a:t>Question 8 of 10 in round 06</a:t>
             </a:r>
             <a:endParaRPr lang="en-US" sz="1100"/>
           </a:p>
@@ -19266,7 +19266,7 @@
             <a:pPr algn="l"/>
             <a:r>
               <a:rPr lang="en-US" sz="4400"/>
-              <a:t>Question 6 of 10 in round 08</a:t>
+              <a:t>Question 8 of 10 in round 06</a:t>
             </a:r>
             <a:endParaRPr lang="en-US" sz="1100"/>
           </a:p>
@@ -19294,7 +19294,7 @@
             <a:pPr algn="l"/>
             <a:r>
               <a:rPr lang="en-US" sz="3600"/>
-              <a:t>Answer 6 of 10 in round 08</a:t>
+              <a:t>Answer 8 of 10 in round 06</a:t>
             </a:r>
             <a:endParaRPr lang="en-US" sz="1100"/>
           </a:p>
@@ -19375,7 +19375,7 @@
             <a:pPr algn="l"/>
             <a:r>
               <a:rPr lang="en-US" sz="4400"/>
-              <a:t>Question 7 of 10 in round 08</a:t>
+              <a:t>Question 8 of 10 in round 07</a:t>
             </a:r>
             <a:endParaRPr lang="en-US" sz="1100"/>
           </a:p>
@@ -19456,7 +19456,7 @@
             <a:pPr algn="l"/>
             <a:r>
               <a:rPr lang="en-US" sz="4400"/>
-              <a:t>Question 7 of 10 in round 01</a:t>
+              <a:t>Question 1 of 10 in round 07</a:t>
             </a:r>
             <a:endParaRPr lang="en-US" sz="1100"/>
           </a:p>
@@ -19537,7 +19537,7 @@
             <a:pPr algn="l"/>
             <a:r>
               <a:rPr lang="en-US" sz="4400"/>
-              <a:t>Question 7 of 10 in round 08</a:t>
+              <a:t>Question 8 of 10 in round 07</a:t>
             </a:r>
             <a:endParaRPr lang="en-US" sz="1100"/>
           </a:p>
@@ -19565,7 +19565,7 @@
             <a:pPr algn="l"/>
             <a:r>
               <a:rPr lang="en-US" sz="3600"/>
-              <a:t>Answer 7 of 10 in round 08</a:t>
+              <a:t>Answer 8 of 10 in round 07</a:t>
             </a:r>
             <a:endParaRPr lang="en-US" sz="1100"/>
           </a:p>
@@ -19836,7 +19836,7 @@
             <a:pPr algn="l"/>
             <a:r>
               <a:rPr lang="en-US" sz="4400"/>
-              <a:t>Question 9 of 10 in round 08</a:t>
+              <a:t>Question 8 of 10 in round 09</a:t>
             </a:r>
             <a:endParaRPr lang="en-US" sz="1100"/>
           </a:p>
@@ -19917,7 +19917,7 @@
             <a:pPr algn="l"/>
             <a:r>
               <a:rPr lang="en-US" sz="4400"/>
-              <a:t>Question 9 of 10 in round 08</a:t>
+              <a:t>Question 8 of 10 in round 09</a:t>
             </a:r>
             <a:endParaRPr lang="en-US" sz="1100"/>
           </a:p>
@@ -19945,7 +19945,7 @@
             <a:pPr algn="l"/>
             <a:r>
               <a:rPr lang="en-US" sz="3600"/>
-              <a:t>Answer 9 of 10 in round 08</a:t>
+              <a:t>Answer 8 of 10 in round 09</a:t>
             </a:r>
             <a:endParaRPr lang="en-US" sz="1100"/>
           </a:p>
@@ -20026,7 +20026,7 @@
             <a:pPr algn="l"/>
             <a:r>
               <a:rPr lang="en-US" sz="4400"/>
-              <a:t>Question 10 of 10 in round 08</a:t>
+              <a:t>Question 8 of 10 in round 10</a:t>
             </a:r>
             <a:endParaRPr lang="en-US" sz="1100"/>
           </a:p>
@@ -20107,7 +20107,7 @@
             <a:pPr algn="l"/>
             <a:r>
               <a:rPr lang="en-US" sz="4400"/>
-              <a:t>Question 10 of 10 in round 08</a:t>
+              <a:t>Question 8 of 10 in round 10</a:t>
             </a:r>
             <a:endParaRPr lang="en-US" sz="1100"/>
           </a:p>
@@ -20135,7 +20135,7 @@
             <a:pPr algn="l"/>
             <a:r>
               <a:rPr lang="en-US" sz="3600"/>
-              <a:t>Answer 10 of 10 in round 08</a:t>
+              <a:t>Answer 8 of 10 in round 10</a:t>
             </a:r>
             <a:endParaRPr lang="en-US" sz="1100"/>
           </a:p>
@@ -20392,7 +20392,7 @@
             <a:pPr algn="l"/>
             <a:r>
               <a:rPr lang="en-US" sz="4400"/>
-              <a:t>Question 1 of 10 in round 09</a:t>
+              <a:t>Question 9 of 10 in round 01</a:t>
             </a:r>
             <a:endParaRPr lang="en-US" sz="1100"/>
           </a:p>
@@ -20473,7 +20473,7 @@
             <a:pPr algn="l"/>
             <a:r>
               <a:rPr lang="en-US" sz="4400"/>
-              <a:t>Question 2 of 10 in round 09</a:t>
+              <a:t>Question 9 of 10 in round 02</a:t>
             </a:r>
             <a:endParaRPr lang="en-US" sz="1100"/>
           </a:p>
@@ -20554,7 +20554,7 @@
             <a:pPr algn="l"/>
             <a:r>
               <a:rPr lang="en-US" sz="4400"/>
-              <a:t>Question 7 of 10 in round 01</a:t>
+              <a:t>Question 1 of 10 in round 07</a:t>
             </a:r>
             <a:endParaRPr lang="en-US" sz="1100"/>
           </a:p>
@@ -20582,7 +20582,7 @@
             <a:pPr algn="l"/>
             <a:r>
               <a:rPr lang="en-US" sz="3600"/>
-              <a:t>Answer 7 of 10 in round 01</a:t>
+              <a:t>Answer 1 of 10 in round 07</a:t>
             </a:r>
             <a:endParaRPr lang="en-US" sz="1100"/>
           </a:p>
@@ -20663,7 +20663,7 @@
             <a:pPr algn="l"/>
             <a:r>
               <a:rPr lang="en-US" sz="4400"/>
-              <a:t>Question 3 of 10 in round 09</a:t>
+              <a:t>Question 9 of 10 in round 03</a:t>
             </a:r>
             <a:endParaRPr lang="en-US" sz="1100"/>
           </a:p>
@@ -20744,7 +20744,7 @@
             <a:pPr algn="l"/>
             <a:r>
               <a:rPr lang="en-US" sz="4400"/>
-              <a:t>Question 4 of 10 in round 09</a:t>
+              <a:t>Question 9 of 10 in round 04</a:t>
             </a:r>
             <a:endParaRPr lang="en-US" sz="1100"/>
           </a:p>
@@ -20825,7 +20825,7 @@
             <a:pPr algn="l"/>
             <a:r>
               <a:rPr lang="en-US" sz="4400"/>
-              <a:t>Question 5 of 10 in round 09</a:t>
+              <a:t>Question 9 of 10 in round 05</a:t>
             </a:r>
             <a:endParaRPr lang="en-US" sz="1100"/>
           </a:p>
@@ -20906,7 +20906,7 @@
             <a:pPr algn="l"/>
             <a:r>
               <a:rPr lang="en-US" sz="4400"/>
-              <a:t>Question 6 of 10 in round 09</a:t>
+              <a:t>Question 9 of 10 in round 06</a:t>
             </a:r>
             <a:endParaRPr lang="en-US" sz="1100"/>
           </a:p>
@@ -20987,7 +20987,7 @@
             <a:pPr algn="l"/>
             <a:r>
               <a:rPr lang="en-US" sz="4400"/>
-              <a:t>Question 7 of 10 in round 09</a:t>
+              <a:t>Question 9 of 10 in round 07</a:t>
             </a:r>
             <a:endParaRPr lang="en-US" sz="1100"/>
           </a:p>
@@ -21068,7 +21068,7 @@
             <a:pPr algn="l"/>
             <a:r>
               <a:rPr lang="en-US" sz="4400"/>
-              <a:t>Question 8 of 10 in round 09</a:t>
+              <a:t>Question 9 of 10 in round 08</a:t>
             </a:r>
             <a:endParaRPr lang="en-US" sz="1100"/>
           </a:p>
@@ -21230,7 +21230,7 @@
             <a:pPr algn="l"/>
             <a:r>
               <a:rPr lang="en-US" sz="4400"/>
-              <a:t>Question 10 of 10 in round 09</a:t>
+              <a:t>Question 9 of 10 in round 10</a:t>
             </a:r>
             <a:endParaRPr lang="en-US" sz="1100"/>
           </a:p>
@@ -21487,7 +21487,7 @@
             <a:pPr algn="l"/>
             <a:r>
               <a:rPr lang="en-US" sz="4400"/>
-              <a:t>Question 1 of 10 in round 09</a:t>
+              <a:t>Question 9 of 10 in round 01</a:t>
             </a:r>
             <a:endParaRPr lang="en-US" sz="1100"/>
           </a:p>
@@ -21568,7 +21568,7 @@
             <a:pPr algn="l"/>
             <a:r>
               <a:rPr lang="en-US" sz="4400"/>
-              <a:t>Question 8 of 10 in round 01</a:t>
+              <a:t>Question 1 of 10 in round 08</a:t>
             </a:r>
             <a:endParaRPr lang="en-US" sz="1100"/>
           </a:p>
@@ -21649,7 +21649,7 @@
             <a:pPr algn="l"/>
             <a:r>
               <a:rPr lang="en-US" sz="4400"/>
-              <a:t>Question 1 of 10 in round 09</a:t>
+              <a:t>Question 9 of 10 in round 01</a:t>
             </a:r>
             <a:endParaRPr lang="en-US" sz="1100"/>
           </a:p>
@@ -21677,7 +21677,7 @@
             <a:pPr algn="l"/>
             <a:r>
               <a:rPr lang="en-US" sz="3600"/>
-              <a:t>Answer 1 of 10 in round 09</a:t>
+              <a:t>Answer 9 of 10 in round 01</a:t>
             </a:r>
             <a:endParaRPr lang="en-US" sz="1100"/>
           </a:p>
@@ -21758,7 +21758,7 @@
             <a:pPr algn="l"/>
             <a:r>
               <a:rPr lang="en-US" sz="4400"/>
-              <a:t>Question 2 of 10 in round 09</a:t>
+              <a:t>Question 9 of 10 in round 02</a:t>
             </a:r>
             <a:endParaRPr lang="en-US" sz="1100"/>
           </a:p>
@@ -21839,7 +21839,7 @@
             <a:pPr algn="l"/>
             <a:r>
               <a:rPr lang="en-US" sz="4400"/>
-              <a:t>Question 2 of 10 in round 09</a:t>
+              <a:t>Question 9 of 10 in round 02</a:t>
             </a:r>
             <a:endParaRPr lang="en-US" sz="1100"/>
           </a:p>
@@ -21867,7 +21867,7 @@
             <a:pPr algn="l"/>
             <a:r>
               <a:rPr lang="en-US" sz="3600"/>
-              <a:t>Answer 2 of 10 in round 09</a:t>
+              <a:t>Answer 9 of 10 in round 02</a:t>
             </a:r>
             <a:endParaRPr lang="en-US" sz="1100"/>
           </a:p>
@@ -21948,7 +21948,7 @@
             <a:pPr algn="l"/>
             <a:r>
               <a:rPr lang="en-US" sz="4400"/>
-              <a:t>Question 3 of 10 in round 09</a:t>
+              <a:t>Question 9 of 10 in round 03</a:t>
             </a:r>
             <a:endParaRPr lang="en-US" sz="1100"/>
           </a:p>
@@ -22029,7 +22029,7 @@
             <a:pPr algn="l"/>
             <a:r>
               <a:rPr lang="en-US" sz="4400"/>
-              <a:t>Question 3 of 10 in round 09</a:t>
+              <a:t>Question 9 of 10 in round 03</a:t>
             </a:r>
             <a:endParaRPr lang="en-US" sz="1100"/>
           </a:p>
@@ -22057,7 +22057,7 @@
             <a:pPr algn="l"/>
             <a:r>
               <a:rPr lang="en-US" sz="3600"/>
-              <a:t>Answer 3 of 10 in round 09</a:t>
+              <a:t>Answer 9 of 10 in round 03</a:t>
             </a:r>
             <a:endParaRPr lang="en-US" sz="1100"/>
           </a:p>
@@ -22138,7 +22138,7 @@
             <a:pPr algn="l"/>
             <a:r>
               <a:rPr lang="en-US" sz="4400"/>
-              <a:t>Question 4 of 10 in round 09</a:t>
+              <a:t>Question 9 of 10 in round 04</a:t>
             </a:r>
             <a:endParaRPr lang="en-US" sz="1100"/>
           </a:p>
@@ -22219,7 +22219,7 @@
             <a:pPr algn="l"/>
             <a:r>
               <a:rPr lang="en-US" sz="4400"/>
-              <a:t>Question 4 of 10 in round 09</a:t>
+              <a:t>Question 9 of 10 in round 04</a:t>
             </a:r>
             <a:endParaRPr lang="en-US" sz="1100"/>
           </a:p>
@@ -22247,7 +22247,7 @@
             <a:pPr algn="l"/>
             <a:r>
               <a:rPr lang="en-US" sz="3600"/>
-              <a:t>Answer 4 of 10 in round 09</a:t>
+              <a:t>Answer 9 of 10 in round 04</a:t>
             </a:r>
             <a:endParaRPr lang="en-US" sz="1100"/>
           </a:p>
@@ -22328,7 +22328,7 @@
             <a:pPr algn="l"/>
             <a:r>
               <a:rPr lang="en-US" sz="4400"/>
-              <a:t>Question 5 of 10 in round 09</a:t>
+              <a:t>Question 9 of 10 in round 05</a:t>
             </a:r>
             <a:endParaRPr lang="en-US" sz="1100"/>
           </a:p>
@@ -22409,7 +22409,7 @@
             <a:pPr algn="l"/>
             <a:r>
               <a:rPr lang="en-US" sz="4400"/>
-              <a:t>Question 5 of 10 in round 09</a:t>
+              <a:t>Question 9 of 10 in round 05</a:t>
             </a:r>
             <a:endParaRPr lang="en-US" sz="1100"/>
           </a:p>
@@ -22437,7 +22437,7 @@
             <a:pPr algn="l"/>
             <a:r>
               <a:rPr lang="en-US" sz="3600"/>
-              <a:t>Answer 5 of 10 in round 09</a:t>
+              <a:t>Answer 9 of 10 in round 05</a:t>
             </a:r>
             <a:endParaRPr lang="en-US" sz="1100"/>
           </a:p>
@@ -22518,7 +22518,7 @@
             <a:pPr algn="l"/>
             <a:r>
               <a:rPr lang="en-US" sz="4400"/>
-              <a:t>Question 6 of 10 in round 09</a:t>
+              <a:t>Question 9 of 10 in round 06</a:t>
             </a:r>
             <a:endParaRPr lang="en-US" sz="1100"/>
           </a:p>
@@ -22599,7 +22599,7 @@
             <a:pPr algn="l"/>
             <a:r>
               <a:rPr lang="en-US" sz="4400"/>
-              <a:t>Question 8 of 10 in round 01</a:t>
+              <a:t>Question 1 of 10 in round 08</a:t>
             </a:r>
             <a:endParaRPr lang="en-US" sz="1100"/>
           </a:p>
@@ -22627,7 +22627,7 @@
             <a:pPr algn="l"/>
             <a:r>
               <a:rPr lang="en-US" sz="3600"/>
-              <a:t>Answer 8 of 10 in round 01</a:t>
+              <a:t>Answer 1 of 10 in round 08</a:t>
             </a:r>
             <a:endParaRPr lang="en-US" sz="1100"/>
           </a:p>
@@ -22708,7 +22708,7 @@
             <a:pPr algn="l"/>
             <a:r>
               <a:rPr lang="en-US" sz="4400"/>
-              <a:t>Question 6 of 10 in round 09</a:t>
+              <a:t>Question 9 of 10 in round 06</a:t>
             </a:r>
             <a:endParaRPr lang="en-US" sz="1100"/>
           </a:p>
@@ -22736,7 +22736,7 @@
             <a:pPr algn="l"/>
             <a:r>
               <a:rPr lang="en-US" sz="3600"/>
-              <a:t>Answer 6 of 10 in round 09</a:t>
+              <a:t>Answer 9 of 10 in round 06</a:t>
             </a:r>
             <a:endParaRPr lang="en-US" sz="1100"/>
           </a:p>
@@ -22817,7 +22817,7 @@
             <a:pPr algn="l"/>
             <a:r>
               <a:rPr lang="en-US" sz="4400"/>
-              <a:t>Question 7 of 10 in round 09</a:t>
+              <a:t>Question 9 of 10 in round 07</a:t>
             </a:r>
             <a:endParaRPr lang="en-US" sz="1100"/>
           </a:p>
@@ -22898,7 +22898,7 @@
             <a:pPr algn="l"/>
             <a:r>
               <a:rPr lang="en-US" sz="4400"/>
-              <a:t>Question 7 of 10 in round 09</a:t>
+              <a:t>Question 9 of 10 in round 07</a:t>
             </a:r>
             <a:endParaRPr lang="en-US" sz="1100"/>
           </a:p>
@@ -22926,7 +22926,7 @@
             <a:pPr algn="l"/>
             <a:r>
               <a:rPr lang="en-US" sz="3600"/>
-              <a:t>Answer 7 of 10 in round 09</a:t>
+              <a:t>Answer 9 of 10 in round 07</a:t>
             </a:r>
             <a:endParaRPr lang="en-US" sz="1100"/>
           </a:p>
@@ -23007,7 +23007,7 @@
             <a:pPr algn="l"/>
             <a:r>
               <a:rPr lang="en-US" sz="4400"/>
-              <a:t>Question 8 of 10 in round 09</a:t>
+              <a:t>Question 9 of 10 in round 08</a:t>
             </a:r>
             <a:endParaRPr lang="en-US" sz="1100"/>
           </a:p>
@@ -23088,7 +23088,7 @@
             <a:pPr algn="l"/>
             <a:r>
               <a:rPr lang="en-US" sz="4400"/>
-              <a:t>Question 8 of 10 in round 09</a:t>
+              <a:t>Question 9 of 10 in round 08</a:t>
             </a:r>
             <a:endParaRPr lang="en-US" sz="1100"/>
           </a:p>
@@ -23116,7 +23116,7 @@
             <a:pPr algn="l"/>
             <a:r>
               <a:rPr lang="en-US" sz="3600"/>
-              <a:t>Answer 8 of 10 in round 09</a:t>
+              <a:t>Answer 9 of 10 in round 08</a:t>
             </a:r>
             <a:endParaRPr lang="en-US" sz="1100"/>
           </a:p>
@@ -23387,7 +23387,7 @@
             <a:pPr algn="l"/>
             <a:r>
               <a:rPr lang="en-US" sz="4400"/>
-              <a:t>Question 10 of 10 in round 09</a:t>
+              <a:t>Question 9 of 10 in round 10</a:t>
             </a:r>
             <a:endParaRPr lang="en-US" sz="1100"/>
           </a:p>
@@ -23468,7 +23468,7 @@
             <a:pPr algn="l"/>
             <a:r>
               <a:rPr lang="en-US" sz="4400"/>
-              <a:t>Question 10 of 10 in round 09</a:t>
+              <a:t>Question 9 of 10 in round 10</a:t>
             </a:r>
             <a:endParaRPr lang="en-US" sz="1100"/>
           </a:p>
@@ -23496,7 +23496,7 @@
             <a:pPr algn="l"/>
             <a:r>
               <a:rPr lang="en-US" sz="3600"/>
-              <a:t>Answer 10 of 10 in round 09</a:t>
+              <a:t>Answer 9 of 10 in round 10</a:t>
             </a:r>
             <a:endParaRPr lang="en-US" sz="1100"/>
           </a:p>
@@ -23753,7 +23753,7 @@
             <a:pPr algn="l"/>
             <a:r>
               <a:rPr lang="en-US" sz="4400"/>
-              <a:t>Question 9 of 10 in round 01</a:t>
+              <a:t>Question 1 of 10 in round 09</a:t>
             </a:r>
             <a:endParaRPr lang="en-US" sz="1100"/>
           </a:p>
@@ -23834,7 +23834,7 @@
             <a:pPr algn="l"/>
             <a:r>
               <a:rPr lang="en-US" sz="4400"/>
-              <a:t>Question 1 of 10 in round 10</a:t>
+              <a:t>Question 10 of 10 in round 01</a:t>
             </a:r>
             <a:endParaRPr lang="en-US" sz="1100"/>
           </a:p>
@@ -23915,7 +23915,7 @@
             <a:pPr algn="l"/>
             <a:r>
               <a:rPr lang="en-US" sz="4400"/>
-              <a:t>Question 2 of 10 in round 10</a:t>
+              <a:t>Question 10 of 10 in round 02</a:t>
             </a:r>
             <a:endParaRPr lang="en-US" sz="1100"/>
           </a:p>
@@ -23996,7 +23996,7 @@
             <a:pPr algn="l"/>
             <a:r>
               <a:rPr lang="en-US" sz="4400"/>
-              <a:t>Question 3 of 10 in round 10</a:t>
+              <a:t>Question 10 of 10 in round 03</a:t>
             </a:r>
             <a:endParaRPr lang="en-US" sz="1100"/>
           </a:p>
@@ -24077,7 +24077,7 @@
             <a:pPr algn="l"/>
             <a:r>
               <a:rPr lang="en-US" sz="4400"/>
-              <a:t>Question 4 of 10 in round 10</a:t>
+              <a:t>Question 10 of 10 in round 04</a:t>
             </a:r>
             <a:endParaRPr lang="en-US" sz="1100"/>
           </a:p>
@@ -24158,7 +24158,7 @@
             <a:pPr algn="l"/>
             <a:r>
               <a:rPr lang="en-US" sz="4400"/>
-              <a:t>Question 5 of 10 in round 10</a:t>
+              <a:t>Question 10 of 10 in round 05</a:t>
             </a:r>
             <a:endParaRPr lang="en-US" sz="1100"/>
           </a:p>
@@ -24239,7 +24239,7 @@
             <a:pPr algn="l"/>
             <a:r>
               <a:rPr lang="en-US" sz="4400"/>
-              <a:t>Question 6 of 10 in round 10</a:t>
+              <a:t>Question 10 of 10 in round 06</a:t>
             </a:r>
             <a:endParaRPr lang="en-US" sz="1100"/>
           </a:p>
@@ -24320,7 +24320,7 @@
             <a:pPr algn="l"/>
             <a:r>
               <a:rPr lang="en-US" sz="4400"/>
-              <a:t>Question 7 of 10 in round 10</a:t>
+              <a:t>Question 10 of 10 in round 07</a:t>
             </a:r>
             <a:endParaRPr lang="en-US" sz="1100"/>
           </a:p>
@@ -24401,7 +24401,7 @@
             <a:pPr algn="l"/>
             <a:r>
               <a:rPr lang="en-US" sz="4400"/>
-              <a:t>Question 8 of 10 in round 10</a:t>
+              <a:t>Question 10 of 10 in round 08</a:t>
             </a:r>
             <a:endParaRPr lang="en-US" sz="1100"/>
           </a:p>
@@ -24482,7 +24482,7 @@
             <a:pPr algn="l"/>
             <a:r>
               <a:rPr lang="en-US" sz="4400"/>
-              <a:t>Question 9 of 10 in round 10</a:t>
+              <a:t>Question 10 of 10 in round 09</a:t>
             </a:r>
             <a:endParaRPr lang="en-US" sz="1100"/>
           </a:p>
@@ -24644,7 +24644,7 @@
             <a:pPr algn="l"/>
             <a:r>
               <a:rPr lang="en-US" sz="4400"/>
-              <a:t>Question 2 of 10 in round 01</a:t>
+              <a:t>Question 1 of 10 in round 02</a:t>
             </a:r>
             <a:endParaRPr lang="en-US" sz="1100"/>
           </a:p>
@@ -24725,7 +24725,7 @@
             <a:pPr algn="l"/>
             <a:r>
               <a:rPr lang="en-US" sz="4400"/>
-              <a:t>Question 9 of 10 in round 01</a:t>
+              <a:t>Question 1 of 10 in round 09</a:t>
             </a:r>
             <a:endParaRPr lang="en-US" sz="1100"/>
           </a:p>
@@ -24753,7 +24753,7 @@
             <a:pPr algn="l"/>
             <a:r>
               <a:rPr lang="en-US" sz="3600"/>
-              <a:t>Answer 9 of 10 in round 01</a:t>
+              <a:t>Answer 1 of 10 in round 09</a:t>
             </a:r>
             <a:endParaRPr lang="en-US" sz="1100"/>
           </a:p>
@@ -25010,7 +25010,7 @@
             <a:pPr algn="l"/>
             <a:r>
               <a:rPr lang="en-US" sz="4400"/>
-              <a:t>Question 1 of 10 in round 10</a:t>
+              <a:t>Question 10 of 10 in round 01</a:t>
             </a:r>
             <a:endParaRPr lang="en-US" sz="1100"/>
           </a:p>
@@ -25091,7 +25091,7 @@
             <a:pPr algn="l"/>
             <a:r>
               <a:rPr lang="en-US" sz="4400"/>
-              <a:t>Question 1 of 10 in round 10</a:t>
+              <a:t>Question 10 of 10 in round 01</a:t>
             </a:r>
             <a:endParaRPr lang="en-US" sz="1100"/>
           </a:p>
@@ -25119,7 +25119,7 @@
             <a:pPr algn="l"/>
             <a:r>
               <a:rPr lang="en-US" sz="3600"/>
-              <a:t>Answer 1 of 10 in round 10</a:t>
+              <a:t>Answer 10 of 10 in round 01</a:t>
             </a:r>
             <a:endParaRPr lang="en-US" sz="1100"/>
           </a:p>
@@ -25200,7 +25200,7 @@
             <a:pPr algn="l"/>
             <a:r>
               <a:rPr lang="en-US" sz="4400"/>
-              <a:t>Question 2 of 10 in round 10</a:t>
+              <a:t>Question 10 of 10 in round 02</a:t>
             </a:r>
             <a:endParaRPr lang="en-US" sz="1100"/>
           </a:p>
@@ -25281,7 +25281,7 @@
             <a:pPr algn="l"/>
             <a:r>
               <a:rPr lang="en-US" sz="4400"/>
-              <a:t>Question 2 of 10 in round 10</a:t>
+              <a:t>Question 10 of 10 in round 02</a:t>
             </a:r>
             <a:endParaRPr lang="en-US" sz="1100"/>
           </a:p>
@@ -25309,7 +25309,7 @@
             <a:pPr algn="l"/>
             <a:r>
               <a:rPr lang="en-US" sz="3600"/>
-              <a:t>Answer 2 of 10 in round 10</a:t>
+              <a:t>Answer 10 of 10 in round 02</a:t>
             </a:r>
             <a:endParaRPr lang="en-US" sz="1100"/>
           </a:p>
@@ -25390,7 +25390,7 @@
             <a:pPr algn="l"/>
             <a:r>
               <a:rPr lang="en-US" sz="4400"/>
-              <a:t>Question 3 of 10 in round 10</a:t>
+              <a:t>Question 10 of 10 in round 03</a:t>
             </a:r>
             <a:endParaRPr lang="en-US" sz="1100"/>
           </a:p>
@@ -25471,7 +25471,7 @@
             <a:pPr algn="l"/>
             <a:r>
               <a:rPr lang="en-US" sz="4400"/>
-              <a:t>Question 3 of 10 in round 10</a:t>
+              <a:t>Question 10 of 10 in round 03</a:t>
             </a:r>
             <a:endParaRPr lang="en-US" sz="1100"/>
           </a:p>
@@ -25499,7 +25499,7 @@
             <a:pPr algn="l"/>
             <a:r>
               <a:rPr lang="en-US" sz="3600"/>
-              <a:t>Answer 3 of 10 in round 10</a:t>
+              <a:t>Answer 10 of 10 in round 03</a:t>
             </a:r>
             <a:endParaRPr lang="en-US" sz="1100"/>
           </a:p>
@@ -25580,7 +25580,7 @@
             <a:pPr algn="l"/>
             <a:r>
               <a:rPr lang="en-US" sz="4400"/>
-              <a:t>Question 4 of 10 in round 10</a:t>
+              <a:t>Question 10 of 10 in round 04</a:t>
             </a:r>
             <a:endParaRPr lang="en-US" sz="1100"/>
           </a:p>
@@ -25661,7 +25661,7 @@
             <a:pPr algn="l"/>
             <a:r>
               <a:rPr lang="en-US" sz="4400"/>
-              <a:t>Question 4 of 10 in round 10</a:t>
+              <a:t>Question 10 of 10 in round 04</a:t>
             </a:r>
             <a:endParaRPr lang="en-US" sz="1100"/>
           </a:p>
@@ -25689,7 +25689,7 @@
             <a:pPr algn="l"/>
             <a:r>
               <a:rPr lang="en-US" sz="3600"/>
-              <a:t>Answer 4 of 10 in round 10</a:t>
+              <a:t>Answer 10 of 10 in round 04</a:t>
             </a:r>
             <a:endParaRPr lang="en-US" sz="1100"/>
           </a:p>
@@ -25770,7 +25770,7 @@
             <a:pPr algn="l"/>
             <a:r>
               <a:rPr lang="en-US" sz="4400"/>
-              <a:t>Question 5 of 10 in round 10</a:t>
+              <a:t>Question 10 of 10 in round 05</a:t>
             </a:r>
             <a:endParaRPr lang="en-US" sz="1100"/>
           </a:p>
@@ -25851,7 +25851,7 @@
             <a:pPr algn="l"/>
             <a:r>
               <a:rPr lang="en-US" sz="4400"/>
-              <a:t>Question 10 of 10 in round 01</a:t>
+              <a:t>Question 1 of 10 in round 10</a:t>
             </a:r>
             <a:endParaRPr lang="en-US" sz="1100"/>
           </a:p>
@@ -25932,7 +25932,7 @@
             <a:pPr algn="l"/>
             <a:r>
               <a:rPr lang="en-US" sz="4400"/>
-              <a:t>Question 5 of 10 in round 10</a:t>
+              <a:t>Question 10 of 10 in round 05</a:t>
             </a:r>
             <a:endParaRPr lang="en-US" sz="1100"/>
           </a:p>
@@ -25960,7 +25960,7 @@
             <a:pPr algn="l"/>
             <a:r>
               <a:rPr lang="en-US" sz="3600"/>
-              <a:t>Answer 5 of 10 in round 10</a:t>
+              <a:t>Answer 10 of 10 in round 05</a:t>
             </a:r>
             <a:endParaRPr lang="en-US" sz="1100"/>
           </a:p>
@@ -26041,7 +26041,7 @@
             <a:pPr algn="l"/>
             <a:r>
               <a:rPr lang="en-US" sz="4400"/>
-              <a:t>Question 6 of 10 in round 10</a:t>
+              <a:t>Question 10 of 10 in round 06</a:t>
             </a:r>
             <a:endParaRPr lang="en-US" sz="1100"/>
           </a:p>
@@ -26122,7 +26122,7 @@
             <a:pPr algn="l"/>
             <a:r>
               <a:rPr lang="en-US" sz="4400"/>
-              <a:t>Question 6 of 10 in round 10</a:t>
+              <a:t>Question 10 of 10 in round 06</a:t>
             </a:r>
             <a:endParaRPr lang="en-US" sz="1100"/>
           </a:p>
@@ -26150,7 +26150,7 @@
             <a:pPr algn="l"/>
             <a:r>
               <a:rPr lang="en-US" sz="3600"/>
-              <a:t>Answer 6 of 10 in round 10</a:t>
+              <a:t>Answer 10 of 10 in round 06</a:t>
             </a:r>
             <a:endParaRPr lang="en-US" sz="1100"/>
           </a:p>
@@ -26231,7 +26231,7 @@
             <a:pPr algn="l"/>
             <a:r>
               <a:rPr lang="en-US" sz="4400"/>
-              <a:t>Question 7 of 10 in round 10</a:t>
+              <a:t>Question 10 of 10 in round 07</a:t>
             </a:r>
             <a:endParaRPr lang="en-US" sz="1100"/>
           </a:p>
@@ -26312,7 +26312,7 @@
             <a:pPr algn="l"/>
             <a:r>
               <a:rPr lang="en-US" sz="4400"/>
-              <a:t>Question 7 of 10 in round 10</a:t>
+              <a:t>Question 10 of 10 in round 07</a:t>
             </a:r>
             <a:endParaRPr lang="en-US" sz="1100"/>
           </a:p>
@@ -26340,7 +26340,7 @@
             <a:pPr algn="l"/>
             <a:r>
               <a:rPr lang="en-US" sz="3600"/>
-              <a:t>Answer 7 of 10 in round 10</a:t>
+              <a:t>Answer 10 of 10 in round 07</a:t>
             </a:r>
             <a:endParaRPr lang="en-US" sz="1100"/>
           </a:p>
@@ -26421,7 +26421,7 @@
             <a:pPr algn="l"/>
             <a:r>
               <a:rPr lang="en-US" sz="4400"/>
-              <a:t>Question 8 of 10 in round 10</a:t>
+              <a:t>Question 10 of 10 in round 08</a:t>
             </a:r>
             <a:endParaRPr lang="en-US" sz="1100"/>
           </a:p>
@@ -26502,7 +26502,7 @@
             <a:pPr algn="l"/>
             <a:r>
               <a:rPr lang="en-US" sz="4400"/>
-              <a:t>Question 8 of 10 in round 10</a:t>
+              <a:t>Question 10 of 10 in round 08</a:t>
             </a:r>
             <a:endParaRPr lang="en-US" sz="1100"/>
           </a:p>
@@ -26530,7 +26530,7 @@
             <a:pPr algn="l"/>
             <a:r>
               <a:rPr lang="en-US" sz="3600"/>
-              <a:t>Answer 8 of 10 in round 10</a:t>
+              <a:t>Answer 10 of 10 in round 08</a:t>
             </a:r>
             <a:endParaRPr lang="en-US" sz="1100"/>
           </a:p>
@@ -26611,7 +26611,7 @@
             <a:pPr algn="l"/>
             <a:r>
               <a:rPr lang="en-US" sz="4400"/>
-              <a:t>Question 9 of 10 in round 10</a:t>
+              <a:t>Question 10 of 10 in round 09</a:t>
             </a:r>
             <a:endParaRPr lang="en-US" sz="1100"/>
           </a:p>
@@ -26692,7 +26692,7 @@
             <a:pPr algn="l"/>
             <a:r>
               <a:rPr lang="en-US" sz="4400"/>
-              <a:t>Question 9 of 10 in round 10</a:t>
+              <a:t>Question 10 of 10 in round 09</a:t>
             </a:r>
             <a:endParaRPr lang="en-US" sz="1100"/>
           </a:p>
@@ -26720,7 +26720,7 @@
             <a:pPr algn="l"/>
             <a:r>
               <a:rPr lang="en-US" sz="3600"/>
-              <a:t>Answer 9 of 10 in round 10</a:t>
+              <a:t>Answer 10 of 10 in round 09</a:t>
             </a:r>
             <a:endParaRPr lang="en-US" sz="1100"/>
           </a:p>
@@ -26882,7 +26882,7 @@
             <a:pPr algn="l"/>
             <a:r>
               <a:rPr lang="en-US" sz="4400"/>
-              <a:t>Question 10 of 10 in round 01</a:t>
+              <a:t>Question 1 of 10 in round 10</a:t>
             </a:r>
             <a:endParaRPr lang="en-US" sz="1100"/>
           </a:p>
@@ -26910,7 +26910,7 @@
             <a:pPr algn="l"/>
             <a:r>
               <a:rPr lang="en-US" sz="3600"/>
-              <a:t>Answer 10 of 10 in round 01</a:t>
+              <a:t>Answer 1 of 10 in round 10</a:t>
             </a:r>
             <a:endParaRPr lang="en-US" sz="1100"/>
           </a:p>
@@ -27276,7 +27276,7 @@
             <a:pPr algn="l"/>
             <a:r>
               <a:rPr lang="en-US" sz="4400"/>
-              <a:t>Question 1 of 10 in round 02</a:t>
+              <a:t>Question 2 of 10 in round 01</a:t>
             </a:r>
             <a:endParaRPr lang="en-US" sz="1100"/>
           </a:p>
@@ -27438,7 +27438,7 @@
             <a:pPr algn="l"/>
             <a:r>
               <a:rPr lang="en-US" sz="4400"/>
-              <a:t>Question 3 of 10 in round 02</a:t>
+              <a:t>Question 2 of 10 in round 03</a:t>
             </a:r>
             <a:endParaRPr lang="en-US" sz="1100"/>
           </a:p>
@@ -27519,7 +27519,7 @@
             <a:pPr algn="l"/>
             <a:r>
               <a:rPr lang="en-US" sz="4400"/>
-              <a:t>Question 4 of 10 in round 02</a:t>
+              <a:t>Question 2 of 10 in round 04</a:t>
             </a:r>
             <a:endParaRPr lang="en-US" sz="1100"/>
           </a:p>
@@ -27600,7 +27600,7 @@
             <a:pPr algn="l"/>
             <a:r>
               <a:rPr lang="en-US" sz="4400"/>
-              <a:t>Question 5 of 10 in round 02</a:t>
+              <a:t>Question 2 of 10 in round 05</a:t>
             </a:r>
             <a:endParaRPr lang="en-US" sz="1100"/>
           </a:p>
@@ -27681,7 +27681,7 @@
             <a:pPr algn="l"/>
             <a:r>
               <a:rPr lang="en-US" sz="4400"/>
-              <a:t>Question 6 of 10 in round 02</a:t>
+              <a:t>Question 2 of 10 in round 06</a:t>
             </a:r>
             <a:endParaRPr lang="en-US" sz="1100"/>
           </a:p>
@@ -27762,7 +27762,7 @@
             <a:pPr algn="l"/>
             <a:r>
               <a:rPr lang="en-US" sz="4400"/>
-              <a:t>Question 3 of 10 in round 01</a:t>
+              <a:t>Question 1 of 10 in round 03</a:t>
             </a:r>
             <a:endParaRPr lang="en-US" sz="1100"/>
           </a:p>
@@ -27843,7 +27843,7 @@
             <a:pPr algn="l"/>
             <a:r>
               <a:rPr lang="en-US" sz="4400"/>
-              <a:t>Question 7 of 10 in round 02</a:t>
+              <a:t>Question 2 of 10 in round 07</a:t>
             </a:r>
             <a:endParaRPr lang="en-US" sz="1100"/>
           </a:p>
@@ -27924,7 +27924,7 @@
             <a:pPr algn="l"/>
             <a:r>
               <a:rPr lang="en-US" sz="4400"/>
-              <a:t>Question 8 of 10 in round 02</a:t>
+              <a:t>Question 2 of 10 in round 08</a:t>
             </a:r>
             <a:endParaRPr lang="en-US" sz="1100"/>
           </a:p>
@@ -28005,7 +28005,7 @@
             <a:pPr algn="l"/>
             <a:r>
               <a:rPr lang="en-US" sz="4400"/>
-              <a:t>Question 9 of 10 in round 02</a:t>
+              <a:t>Question 2 of 10 in round 09</a:t>
             </a:r>
             <a:endParaRPr lang="en-US" sz="1100"/>
           </a:p>
@@ -28086,7 +28086,7 @@
             <a:pPr algn="l"/>
             <a:r>
               <a:rPr lang="en-US" sz="4400"/>
-              <a:t>Question 10 of 10 in round 02</a:t>
+              <a:t>Question 2 of 10 in round 10</a:t>
             </a:r>
             <a:endParaRPr lang="en-US" sz="1100"/>
           </a:p>
@@ -28343,7 +28343,7 @@
             <a:pPr algn="l"/>
             <a:r>
               <a:rPr lang="en-US" sz="4400"/>
-              <a:t>Question 1 of 10 in round 02</a:t>
+              <a:t>Question 2 of 10 in round 01</a:t>
             </a:r>
             <a:endParaRPr lang="en-US" sz="1100"/>
           </a:p>
@@ -28424,7 +28424,7 @@
             <a:pPr algn="l"/>
             <a:r>
               <a:rPr lang="en-US" sz="4400"/>
-              <a:t>Question 1 of 10 in round 02</a:t>
+              <a:t>Question 2 of 10 in round 01</a:t>
             </a:r>
             <a:endParaRPr lang="en-US" sz="1100"/>
           </a:p>
@@ -28452,7 +28452,7 @@
             <a:pPr algn="l"/>
             <a:r>
               <a:rPr lang="en-US" sz="3600"/>
-              <a:t>Answer 1 of 10 in round 02</a:t>
+              <a:t>Answer 2 of 10 in round 01</a:t>
             </a:r>
             <a:endParaRPr lang="en-US" sz="1100"/>
           </a:p>
@@ -28723,7 +28723,7 @@
             <a:pPr algn="l"/>
             <a:r>
               <a:rPr lang="en-US" sz="4400"/>
-              <a:t>Question 3 of 10 in round 02</a:t>
+              <a:t>Question 2 of 10 in round 03</a:t>
             </a:r>
             <a:endParaRPr lang="en-US" sz="1100"/>
           </a:p>
@@ -28804,7 +28804,7 @@
             <a:pPr algn="l"/>
             <a:r>
               <a:rPr lang="en-US" sz="4400"/>
-              <a:t>Question 4 of 10 in round 01</a:t>
+              <a:t>Question 1 of 10 in round 04</a:t>
             </a:r>
             <a:endParaRPr lang="en-US" sz="1100"/>
           </a:p>
@@ -28885,7 +28885,7 @@
             <a:pPr algn="l"/>
             <a:r>
               <a:rPr lang="en-US" sz="4400"/>
-              <a:t>Question 3 of 10 in round 02</a:t>
+              <a:t>Question 2 of 10 in round 03</a:t>
             </a:r>
             <a:endParaRPr lang="en-US" sz="1100"/>
           </a:p>
@@ -28913,7 +28913,7 @@
             <a:pPr algn="l"/>
             <a:r>
               <a:rPr lang="en-US" sz="3600"/>
-              <a:t>Answer 3 of 10 in round 02</a:t>
+              <a:t>Answer 2 of 10 in round 03</a:t>
             </a:r>
             <a:endParaRPr lang="en-US" sz="1100"/>
           </a:p>
@@ -28994,7 +28994,7 @@
             <a:pPr algn="l"/>
             <a:r>
               <a:rPr lang="en-US" sz="4400"/>
-              <a:t>Question 4 of 10 in round 02</a:t>
+              <a:t>Question 2 of 10 in round 04</a:t>
             </a:r>
             <a:endParaRPr lang="en-US" sz="1100"/>
           </a:p>
@@ -29075,7 +29075,7 @@
             <a:pPr algn="l"/>
             <a:r>
               <a:rPr lang="en-US" sz="4400"/>
-              <a:t>Question 4 of 10 in round 02</a:t>
+              <a:t>Question 2 of 10 in round 04</a:t>
             </a:r>
             <a:endParaRPr lang="en-US" sz="1100"/>
           </a:p>
@@ -29103,7 +29103,7 @@
             <a:pPr algn="l"/>
             <a:r>
               <a:rPr lang="en-US" sz="3600"/>
-              <a:t>Answer 4 of 10 in round 02</a:t>
+              <a:t>Answer 2 of 10 in round 04</a:t>
             </a:r>
             <a:endParaRPr lang="en-US" sz="1100"/>
           </a:p>
@@ -29184,7 +29184,7 @@
             <a:pPr algn="l"/>
             <a:r>
               <a:rPr lang="en-US" sz="4400"/>
-              <a:t>Question 5 of 10 in round 02</a:t>
+              <a:t>Question 2 of 10 in round 05</a:t>
             </a:r>
             <a:endParaRPr lang="en-US" sz="1100"/>
           </a:p>
@@ -29265,7 +29265,7 @@
             <a:pPr algn="l"/>
             <a:r>
               <a:rPr lang="en-US" sz="4400"/>
-              <a:t>Question 5 of 10 in round 02</a:t>
+              <a:t>Question 2 of 10 in round 05</a:t>
             </a:r>
             <a:endParaRPr lang="en-US" sz="1100"/>
           </a:p>
@@ -29293,7 +29293,7 @@
             <a:pPr algn="l"/>
             <a:r>
               <a:rPr lang="en-US" sz="3600"/>
-              <a:t>Answer 5 of 10 in round 02</a:t>
+              <a:t>Answer 2 of 10 in round 05</a:t>
             </a:r>
             <a:endParaRPr lang="en-US" sz="1100"/>
           </a:p>
@@ -29374,7 +29374,7 @@
             <a:pPr algn="l"/>
             <a:r>
               <a:rPr lang="en-US" sz="4400"/>
-              <a:t>Question 6 of 10 in round 02</a:t>
+              <a:t>Question 2 of 10 in round 06</a:t>
             </a:r>
             <a:endParaRPr lang="en-US" sz="1100"/>
           </a:p>
@@ -29455,7 +29455,7 @@
             <a:pPr algn="l"/>
             <a:r>
               <a:rPr lang="en-US" sz="4400"/>
-              <a:t>Question 6 of 10 in round 02</a:t>
+              <a:t>Question 2 of 10 in round 06</a:t>
             </a:r>
             <a:endParaRPr lang="en-US" sz="1100"/>
           </a:p>
@@ -29483,7 +29483,7 @@
             <a:pPr algn="l"/>
             <a:r>
               <a:rPr lang="en-US" sz="3600"/>
-              <a:t>Answer 6 of 10 in round 02</a:t>
+              <a:t>Answer 2 of 10 in round 06</a:t>
             </a:r>
             <a:endParaRPr lang="en-US" sz="1100"/>
           </a:p>
@@ -29564,7 +29564,7 @@
             <a:pPr algn="l"/>
             <a:r>
               <a:rPr lang="en-US" sz="4400"/>
-              <a:t>Question 7 of 10 in round 02</a:t>
+              <a:t>Question 2 of 10 in round 07</a:t>
             </a:r>
             <a:endParaRPr lang="en-US" sz="1100"/>
           </a:p>
@@ -29645,7 +29645,7 @@
             <a:pPr algn="l"/>
             <a:r>
               <a:rPr lang="en-US" sz="4400"/>
-              <a:t>Question 7 of 10 in round 02</a:t>
+              <a:t>Question 2 of 10 in round 07</a:t>
             </a:r>
             <a:endParaRPr lang="en-US" sz="1100"/>
           </a:p>
@@ -29673,7 +29673,7 @@
             <a:pPr algn="l"/>
             <a:r>
               <a:rPr lang="en-US" sz="3600"/>
-              <a:t>Answer 7 of 10 in round 02</a:t>
+              <a:t>Answer 2 of 10 in round 07</a:t>
             </a:r>
             <a:endParaRPr lang="en-US" sz="1100"/>
           </a:p>
@@ -29754,7 +29754,7 @@
             <a:pPr algn="l"/>
             <a:r>
               <a:rPr lang="en-US" sz="4400"/>
-              <a:t>Question 8 of 10 in round 02</a:t>
+              <a:t>Question 2 of 10 in round 08</a:t>
             </a:r>
             <a:endParaRPr lang="en-US" sz="1100"/>
           </a:p>
@@ -29835,7 +29835,7 @@
             <a:pPr algn="l"/>
             <a:r>
               <a:rPr lang="en-US" sz="4400"/>
-              <a:t>Question 5 of 10 in round 01</a:t>
+              <a:t>Question 1 of 10 in round 05</a:t>
             </a:r>
             <a:endParaRPr lang="en-US" sz="1100"/>
           </a:p>
@@ -29916,7 +29916,7 @@
             <a:pPr algn="l"/>
             <a:r>
               <a:rPr lang="en-US" sz="4400"/>
-              <a:t>Question 8 of 10 in round 02</a:t>
+              <a:t>Question 2 of 10 in round 08</a:t>
             </a:r>
             <a:endParaRPr lang="en-US" sz="1100"/>
           </a:p>
@@ -29944,7 +29944,7 @@
             <a:pPr algn="l"/>
             <a:r>
               <a:rPr lang="en-US" sz="3600"/>
-              <a:t>Answer 8 of 10 in round 02</a:t>
+              <a:t>Answer 2 of 10 in round 08</a:t>
             </a:r>
             <a:endParaRPr lang="en-US" sz="1100"/>
           </a:p>
@@ -30025,7 +30025,7 @@
             <a:pPr algn="l"/>
             <a:r>
               <a:rPr lang="en-US" sz="4400"/>
-              <a:t>Question 9 of 10 in round 02</a:t>
+              <a:t>Question 2 of 10 in round 09</a:t>
             </a:r>
             <a:endParaRPr lang="en-US" sz="1100"/>
           </a:p>
@@ -30106,7 +30106,7 @@
             <a:pPr algn="l"/>
             <a:r>
               <a:rPr lang="en-US" sz="4400"/>
-              <a:t>Question 9 of 10 in round 02</a:t>
+              <a:t>Question 2 of 10 in round 09</a:t>
             </a:r>
             <a:endParaRPr lang="en-US" sz="1100"/>
           </a:p>
@@ -30134,7 +30134,7 @@
             <a:pPr algn="l"/>
             <a:r>
               <a:rPr lang="en-US" sz="3600"/>
-              <a:t>Answer 9 of 10 in round 02</a:t>
+              <a:t>Answer 2 of 10 in round 09</a:t>
             </a:r>
             <a:endParaRPr lang="en-US" sz="1100"/>
           </a:p>
@@ -30215,7 +30215,7 @@
             <a:pPr algn="l"/>
             <a:r>
               <a:rPr lang="en-US" sz="4400"/>
-              <a:t>Question 10 of 10 in round 02</a:t>
+              <a:t>Question 2 of 10 in round 10</a:t>
             </a:r>
             <a:endParaRPr lang="en-US" sz="1100"/>
           </a:p>
@@ -30296,7 +30296,7 @@
             <a:pPr algn="l"/>
             <a:r>
               <a:rPr lang="en-US" sz="4400"/>
-              <a:t>Question 10 of 10 in round 02</a:t>
+              <a:t>Question 2 of 10 in round 10</a:t>
             </a:r>
             <a:endParaRPr lang="en-US" sz="1100"/>
           </a:p>
@@ -30324,7 +30324,7 @@
             <a:pPr algn="l"/>
             <a:r>
               <a:rPr lang="en-US" sz="3600"/>
-              <a:t>Answer 10 of 10 in round 02</a:t>
+              <a:t>Answer 2 of 10 in round 10</a:t>
             </a:r>
             <a:endParaRPr lang="en-US" sz="1100"/>
           </a:p>
@@ -30581,7 +30581,7 @@
             <a:pPr algn="l"/>
             <a:r>
               <a:rPr lang="en-US" sz="4400"/>
-              <a:t>Question 1 of 10 in round 03</a:t>
+              <a:t>Question 3 of 10 in round 01</a:t>
             </a:r>
             <a:endParaRPr lang="en-US" sz="1100"/>
           </a:p>
@@ -30662,7 +30662,7 @@
             <a:pPr algn="l"/>
             <a:r>
               <a:rPr lang="en-US" sz="4400"/>
-              <a:t>Question 2 of 10 in round 03</a:t>
+              <a:t>Question 3 of 10 in round 02</a:t>
             </a:r>
             <a:endParaRPr lang="en-US" sz="1100"/>
           </a:p>
@@ -30824,7 +30824,7 @@
             <a:pPr algn="l"/>
             <a:r>
               <a:rPr lang="en-US" sz="4400"/>
-              <a:t>Question 4 of 10 in round 03</a:t>
+              <a:t>Question 3 of 10 in round 04</a:t>
             </a:r>
             <a:endParaRPr lang="en-US" sz="1100"/>
           </a:p>
@@ -30905,7 +30905,7 @@
             <a:pPr algn="l"/>
             <a:r>
               <a:rPr lang="en-US" sz="4400"/>
-              <a:t>Question 6 of 10 in round 01</a:t>
+              <a:t>Question 1 of 10 in round 06</a:t>
             </a:r>
             <a:endParaRPr lang="en-US" sz="1100"/>
           </a:p>
@@ -30986,7 +30986,7 @@
             <a:pPr algn="l"/>
             <a:r>
               <a:rPr lang="en-US" sz="4400"/>
-              <a:t>Question 5 of 10 in round 03</a:t>
+              <a:t>Question 3 of 10 in round 05</a:t>
             </a:r>
             <a:endParaRPr lang="en-US" sz="1100"/>
           </a:p>
@@ -31067,7 +31067,7 @@
             <a:pPr algn="l"/>
             <a:r>
               <a:rPr lang="en-US" sz="4400"/>
-              <a:t>Question 6 of 10 in round 03</a:t>
+              <a:t>Question 3 of 10 in round 06</a:t>
             </a:r>
             <a:endParaRPr lang="en-US" sz="1100"/>
           </a:p>
@@ -31148,7 +31148,7 @@
             <a:pPr algn="l"/>
             <a:r>
               <a:rPr lang="en-US" sz="4400"/>
-              <a:t>Question 7 of 10 in round 03</a:t>
+              <a:t>Question 3 of 10 in round 07</a:t>
             </a:r>
             <a:endParaRPr lang="en-US" sz="1100"/>
           </a:p>
@@ -31229,7 +31229,7 @@
             <a:pPr algn="l"/>
             <a:r>
               <a:rPr lang="en-US" sz="4400"/>
-              <a:t>Question 8 of 10 in round 03</a:t>
+              <a:t>Question 3 of 10 in round 08</a:t>
             </a:r>
             <a:endParaRPr lang="en-US" sz="1100"/>
           </a:p>
@@ -31310,7 +31310,7 @@
             <a:pPr algn="l"/>
             <a:r>
               <a:rPr lang="en-US" sz="4400"/>
-              <a:t>Question 9 of 10 in round 03</a:t>
+              <a:t>Question 3 of 10 in round 09</a:t>
             </a:r>
             <a:endParaRPr lang="en-US" sz="1100"/>
           </a:p>
@@ -31391,7 +31391,7 @@
             <a:pPr algn="l"/>
             <a:r>
               <a:rPr lang="en-US" sz="4400"/>
-              <a:t>Question 10 of 10 in round 03</a:t>
+              <a:t>Question 3 of 10 in round 10</a:t>
             </a:r>
             <a:endParaRPr lang="en-US" sz="1100"/>
           </a:p>
@@ -31648,7 +31648,7 @@
             <a:pPr algn="l"/>
             <a:r>
               <a:rPr lang="en-US" sz="4400"/>
-              <a:t>Question 1 of 10 in round 03</a:t>
+              <a:t>Question 3 of 10 in round 01</a:t>
             </a:r>
             <a:endParaRPr lang="en-US" sz="1100"/>
           </a:p>
@@ -31729,7 +31729,7 @@
             <a:pPr algn="l"/>
             <a:r>
               <a:rPr lang="en-US" sz="4400"/>
-              <a:t>Question 1 of 10 in round 03</a:t>
+              <a:t>Question 3 of 10 in round 01</a:t>
             </a:r>
             <a:endParaRPr lang="en-US" sz="1100"/>
           </a:p>
@@ -31757,7 +31757,7 @@
             <a:pPr algn="l"/>
             <a:r>
               <a:rPr lang="en-US" sz="3600"/>
-              <a:t>Answer 1 of 10 in round 03</a:t>
+              <a:t>Answer 3 of 10 in round 01</a:t>
             </a:r>
             <a:endParaRPr lang="en-US" sz="1100"/>
           </a:p>
@@ -31838,7 +31838,7 @@
             <a:pPr algn="l"/>
             <a:r>
               <a:rPr lang="en-US" sz="4400"/>
-              <a:t>Question 2 of 10 in round 03</a:t>
+              <a:t>Question 3 of 10 in round 02</a:t>
             </a:r>
             <a:endParaRPr lang="en-US" sz="1100"/>
           </a:p>
@@ -31919,7 +31919,7 @@
             <a:pPr algn="l"/>
             <a:r>
               <a:rPr lang="en-US" sz="4400"/>
-              <a:t>Question 7 of 10 in round 01</a:t>
+              <a:t>Question 1 of 10 in round 07</a:t>
             </a:r>
             <a:endParaRPr lang="en-US" sz="1100"/>
           </a:p>
@@ -32000,7 +32000,7 @@
             <a:pPr algn="l"/>
             <a:r>
               <a:rPr lang="en-US" sz="4400"/>
-              <a:t>Question 2 of 10 in round 03</a:t>
+              <a:t>Question 3 of 10 in round 02</a:t>
             </a:r>
             <a:endParaRPr lang="en-US" sz="1100"/>
           </a:p>
@@ -32028,7 +32028,7 @@
             <a:pPr algn="l"/>
             <a:r>
               <a:rPr lang="en-US" sz="3600"/>
-              <a:t>Answer 2 of 10 in round 03</a:t>
+              <a:t>Answer 3 of 10 in round 02</a:t>
             </a:r>
             <a:endParaRPr lang="en-US" sz="1100"/>
           </a:p>
@@ -32299,7 +32299,7 @@
             <a:pPr algn="l"/>
             <a:r>
               <a:rPr lang="en-US" sz="4400"/>
-              <a:t>Question 4 of 10 in round 03</a:t>
+              <a:t>Question 3 of 10 in round 04</a:t>
             </a:r>
             <a:endParaRPr lang="en-US" sz="1100"/>
           </a:p>
@@ -32380,7 +32380,7 @@
             <a:pPr algn="l"/>
             <a:r>
               <a:rPr lang="en-US" sz="4400"/>
-              <a:t>Question 4 of 10 in round 03</a:t>
+              <a:t>Question 3 of 10 in round 04</a:t>
             </a:r>
             <a:endParaRPr lang="en-US" sz="1100"/>
           </a:p>
@@ -32408,7 +32408,7 @@
             <a:pPr algn="l"/>
             <a:r>
               <a:rPr lang="en-US" sz="3600"/>
-              <a:t>Answer 4 of 10 in round 03</a:t>
+              <a:t>Answer 3 of 10 in round 04</a:t>
             </a:r>
             <a:endParaRPr lang="en-US" sz="1100"/>
           </a:p>
@@ -32489,7 +32489,7 @@
             <a:pPr algn="l"/>
             <a:r>
               <a:rPr lang="en-US" sz="4400"/>
-              <a:t>Question 5 of 10 in round 03</a:t>
+              <a:t>Question 3 of 10 in round 05</a:t>
             </a:r>
             <a:endParaRPr lang="en-US" sz="1100"/>
           </a:p>
@@ -32570,7 +32570,7 @@
             <a:pPr algn="l"/>
             <a:r>
               <a:rPr lang="en-US" sz="4400"/>
-              <a:t>Question 5 of 10 in round 03</a:t>
+              <a:t>Question 3 of 10 in round 05</a:t>
             </a:r>
             <a:endParaRPr lang="en-US" sz="1100"/>
           </a:p>
@@ -32598,7 +32598,7 @@
             <a:pPr algn="l"/>
             <a:r>
               <a:rPr lang="en-US" sz="3600"/>
-              <a:t>Answer 5 of 10 in round 03</a:t>
+              <a:t>Answer 3 of 10 in round 05</a:t>
             </a:r>
             <a:endParaRPr lang="en-US" sz="1100"/>
           </a:p>
@@ -32679,7 +32679,7 @@
             <a:pPr algn="l"/>
             <a:r>
               <a:rPr lang="en-US" sz="4400"/>
-              <a:t>Question 6 of 10 in round 03</a:t>
+              <a:t>Question 3 of 10 in round 06</a:t>
             </a:r>
             <a:endParaRPr lang="en-US" sz="1100"/>
           </a:p>
@@ -32760,7 +32760,7 @@
             <a:pPr algn="l"/>
             <a:r>
               <a:rPr lang="en-US" sz="4400"/>
-              <a:t>Question 6 of 10 in round 03</a:t>
+              <a:t>Question 3 of 10 in round 06</a:t>
             </a:r>
             <a:endParaRPr lang="en-US" sz="1100"/>
           </a:p>
@@ -32788,7 +32788,7 @@
             <a:pPr algn="l"/>
             <a:r>
               <a:rPr lang="en-US" sz="3600"/>
-              <a:t>Answer 6 of 10 in round 03</a:t>
+              <a:t>Answer 3 of 10 in round 06</a:t>
             </a:r>
             <a:endParaRPr lang="en-US" sz="1100"/>
           </a:p>
@@ -32869,7 +32869,7 @@
             <a:pPr algn="l"/>
             <a:r>
               <a:rPr lang="en-US" sz="4400"/>
-              <a:t>Question 7 of 10 in round 03</a:t>
+              <a:t>Question 3 of 10 in round 07</a:t>
             </a:r>
             <a:endParaRPr lang="en-US" sz="1100"/>
           </a:p>
@@ -32950,7 +32950,7 @@
             <a:pPr algn="l"/>
             <a:r>
               <a:rPr lang="en-US" sz="4400"/>
-              <a:t>Question 8 of 10 in round 01</a:t>
+              <a:t>Question 1 of 10 in round 08</a:t>
             </a:r>
             <a:endParaRPr lang="en-US" sz="1100"/>
           </a:p>
@@ -33031,7 +33031,7 @@
             <a:pPr algn="l"/>
             <a:r>
               <a:rPr lang="en-US" sz="4400"/>
-              <a:t>Question 7 of 10 in round 03</a:t>
+              <a:t>Question 3 of 10 in round 07</a:t>
             </a:r>
             <a:endParaRPr lang="en-US" sz="1100"/>
           </a:p>
@@ -33059,7 +33059,7 @@
             <a:pPr algn="l"/>
             <a:r>
               <a:rPr lang="en-US" sz="3600"/>
-              <a:t>Answer 7 of 10 in round 03</a:t>
+              <a:t>Answer 3 of 10 in round 07</a:t>
             </a:r>
             <a:endParaRPr lang="en-US" sz="1100"/>
           </a:p>
@@ -33140,7 +33140,7 @@
             <a:pPr algn="l"/>
             <a:r>
               <a:rPr lang="en-US" sz="4400"/>
-              <a:t>Question 8 of 10 in round 03</a:t>
+              <a:t>Question 3 of 10 in round 08</a:t>
             </a:r>
             <a:endParaRPr lang="en-US" sz="1100"/>
           </a:p>
@@ -33221,7 +33221,7 @@
             <a:pPr algn="l"/>
             <a:r>
               <a:rPr lang="en-US" sz="4400"/>
-              <a:t>Question 8 of 10 in round 03</a:t>
+              <a:t>Question 3 of 10 in round 08</a:t>
             </a:r>
             <a:endParaRPr lang="en-US" sz="1100"/>
           </a:p>
@@ -33249,7 +33249,7 @@
             <a:pPr algn="l"/>
             <a:r>
               <a:rPr lang="en-US" sz="3600"/>
-              <a:t>Answer 8 of 10 in round 03</a:t>
+              <a:t>Answer 3 of 10 in round 08</a:t>
             </a:r>
             <a:endParaRPr lang="en-US" sz="1100"/>
           </a:p>
@@ -33330,7 +33330,7 @@
             <a:pPr algn="l"/>
             <a:r>
               <a:rPr lang="en-US" sz="4400"/>
-              <a:t>Question 9 of 10 in round 03</a:t>
+              <a:t>Question 3 of 10 in round 09</a:t>
             </a:r>
             <a:endParaRPr lang="en-US" sz="1100"/>
           </a:p>
@@ -33411,7 +33411,7 @@
             <a:pPr algn="l"/>
             <a:r>
               <a:rPr lang="en-US" sz="4400"/>
-              <a:t>Question 9 of 10 in round 03</a:t>
+              <a:t>Question 3 of 10 in round 09</a:t>
             </a:r>
             <a:endParaRPr lang="en-US" sz="1100"/>
           </a:p>
@@ -33439,7 +33439,7 @@
             <a:pPr algn="l"/>
             <a:r>
               <a:rPr lang="en-US" sz="3600"/>
-              <a:t>Answer 9 of 10 in round 03</a:t>
+              <a:t>Answer 3 of 10 in round 09</a:t>
             </a:r>
             <a:endParaRPr lang="en-US" sz="1100"/>
           </a:p>
@@ -33520,7 +33520,7 @@
             <a:pPr algn="l"/>
             <a:r>
               <a:rPr lang="en-US" sz="4400"/>
-              <a:t>Question 10 of 10 in round 03</a:t>
+              <a:t>Question 3 of 10 in round 10</a:t>
             </a:r>
             <a:endParaRPr lang="en-US" sz="1100"/>
           </a:p>
@@ -33601,7 +33601,7 @@
             <a:pPr algn="l"/>
             <a:r>
               <a:rPr lang="en-US" sz="4400"/>
-              <a:t>Question 10 of 10 in round 03</a:t>
+              <a:t>Question 3 of 10 in round 10</a:t>
             </a:r>
             <a:endParaRPr lang="en-US" sz="1100"/>
           </a:p>
@@ -33629,7 +33629,7 @@
             <a:pPr algn="l"/>
             <a:r>
               <a:rPr lang="en-US" sz="3600"/>
-              <a:t>Answer 10 of 10 in round 03</a:t>
+              <a:t>Answer 3 of 10 in round 10</a:t>
             </a:r>
             <a:endParaRPr lang="en-US" sz="1100"/>
           </a:p>
@@ -33886,7 +33886,7 @@
             <a:pPr algn="l"/>
             <a:r>
               <a:rPr lang="en-US" sz="4400"/>
-              <a:t>Question 1 of 10 in round 04</a:t>
+              <a:t>Question 4 of 10 in round 01</a:t>
             </a:r>
             <a:endParaRPr lang="en-US" sz="1100"/>
           </a:p>
@@ -33967,7 +33967,7 @@
             <a:pPr algn="l"/>
             <a:r>
               <a:rPr lang="en-US" sz="4400"/>
-              <a:t>Question 2 of 10 in round 04</a:t>
+              <a:t>Question 4 of 10 in round 02</a:t>
             </a:r>
             <a:endParaRPr lang="en-US" sz="1100"/>
           </a:p>

</xml_diff>